<commit_message>
slight change to subproblem graph and formatted into slideshow
</commit_message>
<xml_diff>
--- a/example_class_3/Subproblem graph.pptx
+++ b/example_class_3/Subproblem graph.pptx
@@ -104,6 +104,11 @@
       </a:defRPr>
     </a:lvl9pPr>
   </p:defaultTextStyle>
+  <p:extLst>
+    <p:ext uri="{EFAFB233-063F-42B5-8137-9DF3F51BA10A}">
+      <p15:sldGuideLst xmlns:p15="http://schemas.microsoft.com/office/powerpoint/2012/main"/>
+    </p:ext>
+  </p:extLst>
 </p:presentation>
 </file>
 
@@ -256,7 +261,7 @@
           <a:p>
             <a:fld id="{3E1B4801-6BF7-4998-8405-2590A5E52B70}" type="datetimeFigureOut">
               <a:rPr lang="en-SG" smtClean="0"/>
-              <a:t>23/10/2021</a:t>
+              <a:t>29/10/2021</a:t>
             </a:fld>
             <a:endParaRPr lang="en-SG"/>
           </a:p>
@@ -456,7 +461,7 @@
           <a:p>
             <a:fld id="{3E1B4801-6BF7-4998-8405-2590A5E52B70}" type="datetimeFigureOut">
               <a:rPr lang="en-SG" smtClean="0"/>
-              <a:t>23/10/2021</a:t>
+              <a:t>29/10/2021</a:t>
             </a:fld>
             <a:endParaRPr lang="en-SG"/>
           </a:p>
@@ -666,7 +671,7 @@
           <a:p>
             <a:fld id="{3E1B4801-6BF7-4998-8405-2590A5E52B70}" type="datetimeFigureOut">
               <a:rPr lang="en-SG" smtClean="0"/>
-              <a:t>23/10/2021</a:t>
+              <a:t>29/10/2021</a:t>
             </a:fld>
             <a:endParaRPr lang="en-SG"/>
           </a:p>
@@ -866,7 +871,7 @@
           <a:p>
             <a:fld id="{3E1B4801-6BF7-4998-8405-2590A5E52B70}" type="datetimeFigureOut">
               <a:rPr lang="en-SG" smtClean="0"/>
-              <a:t>23/10/2021</a:t>
+              <a:t>29/10/2021</a:t>
             </a:fld>
             <a:endParaRPr lang="en-SG"/>
           </a:p>
@@ -1142,7 +1147,7 @@
           <a:p>
             <a:fld id="{3E1B4801-6BF7-4998-8405-2590A5E52B70}" type="datetimeFigureOut">
               <a:rPr lang="en-SG" smtClean="0"/>
-              <a:t>23/10/2021</a:t>
+              <a:t>29/10/2021</a:t>
             </a:fld>
             <a:endParaRPr lang="en-SG"/>
           </a:p>
@@ -1410,7 +1415,7 @@
           <a:p>
             <a:fld id="{3E1B4801-6BF7-4998-8405-2590A5E52B70}" type="datetimeFigureOut">
               <a:rPr lang="en-SG" smtClean="0"/>
-              <a:t>23/10/2021</a:t>
+              <a:t>29/10/2021</a:t>
             </a:fld>
             <a:endParaRPr lang="en-SG"/>
           </a:p>
@@ -1825,7 +1830,7 @@
           <a:p>
             <a:fld id="{3E1B4801-6BF7-4998-8405-2590A5E52B70}" type="datetimeFigureOut">
               <a:rPr lang="en-SG" smtClean="0"/>
-              <a:t>23/10/2021</a:t>
+              <a:t>29/10/2021</a:t>
             </a:fld>
             <a:endParaRPr lang="en-SG"/>
           </a:p>
@@ -1967,7 +1972,7 @@
           <a:p>
             <a:fld id="{3E1B4801-6BF7-4998-8405-2590A5E52B70}" type="datetimeFigureOut">
               <a:rPr lang="en-SG" smtClean="0"/>
-              <a:t>23/10/2021</a:t>
+              <a:t>29/10/2021</a:t>
             </a:fld>
             <a:endParaRPr lang="en-SG"/>
           </a:p>
@@ -2080,7 +2085,7 @@
           <a:p>
             <a:fld id="{3E1B4801-6BF7-4998-8405-2590A5E52B70}" type="datetimeFigureOut">
               <a:rPr lang="en-SG" smtClean="0"/>
-              <a:t>23/10/2021</a:t>
+              <a:t>29/10/2021</a:t>
             </a:fld>
             <a:endParaRPr lang="en-SG"/>
           </a:p>
@@ -2393,7 +2398,7 @@
           <a:p>
             <a:fld id="{3E1B4801-6BF7-4998-8405-2590A5E52B70}" type="datetimeFigureOut">
               <a:rPr lang="en-SG" smtClean="0"/>
-              <a:t>23/10/2021</a:t>
+              <a:t>29/10/2021</a:t>
             </a:fld>
             <a:endParaRPr lang="en-SG"/>
           </a:p>
@@ -2682,7 +2687,7 @@
           <a:p>
             <a:fld id="{3E1B4801-6BF7-4998-8405-2590A5E52B70}" type="datetimeFigureOut">
               <a:rPr lang="en-SG" smtClean="0"/>
-              <a:t>23/10/2021</a:t>
+              <a:t>29/10/2021</a:t>
             </a:fld>
             <a:endParaRPr lang="en-SG"/>
           </a:p>
@@ -2925,7 +2930,7 @@
           <a:p>
             <a:fld id="{3E1B4801-6BF7-4998-8405-2590A5E52B70}" type="datetimeFigureOut">
               <a:rPr lang="en-SG" smtClean="0"/>
-              <a:t>23/10/2021</a:t>
+              <a:t>29/10/2021</a:t>
             </a:fld>
             <a:endParaRPr lang="en-SG"/>
           </a:p>
@@ -3447,41 +3452,6 @@
           </a:p>
         </p:txBody>
       </p:sp>
-      <p:sp>
-        <p:nvSpPr>
-          <p:cNvPr id="9" name="TextBox 8">
-            <a:extLst>
-              <a:ext uri="{FF2B5EF4-FFF2-40B4-BE49-F238E27FC236}">
-                <a16:creationId xmlns:a16="http://schemas.microsoft.com/office/drawing/2014/main" id="{EB364816-47E0-4037-85AF-BF1430F8F921}"/>
-              </a:ext>
-            </a:extLst>
-          </p:cNvPr>
-          <p:cNvSpPr txBox="1"/>
-          <p:nvPr/>
-        </p:nvSpPr>
-        <p:spPr>
-          <a:xfrm>
-            <a:off x="3407823" y="6419864"/>
-            <a:ext cx="790575" cy="369332"/>
-          </a:xfrm>
-          <a:prstGeom prst="rect">
-            <a:avLst/>
-          </a:prstGeom>
-          <a:noFill/>
-        </p:spPr>
-        <p:txBody>
-          <a:bodyPr wrap="square" rtlCol="0">
-            <a:spAutoFit/>
-          </a:bodyPr>
-          <a:lstStyle/>
-          <a:p>
-            <a:r>
-              <a:rPr lang="en-SG" dirty="0"/>
-              <a:t>(14,3)</a:t>
-            </a:r>
-          </a:p>
-        </p:txBody>
-      </p:sp>
       <p:graphicFrame>
         <p:nvGraphicFramePr>
           <p:cNvPr id="10" name="Table 10">
@@ -3660,11 +3630,11 @@
           <a:lstStyle/>
           <a:p>
             <a:r>
-              <a:rPr lang="en-SG" dirty="0" err="1"/>
+              <a:rPr lang="en-SG" dirty="0"/>
               <a:t>w</a:t>
             </a:r>
             <a:r>
-              <a:rPr lang="en-SG" baseline="-25000" dirty="0" err="1"/>
+              <a:rPr lang="en-SG" baseline="-25000" dirty="0"/>
               <a:t>i</a:t>
             </a:r>
             <a:endParaRPr lang="en-SG" dirty="0"/>
@@ -4806,7 +4776,7 @@
         </p:nvCxnSpPr>
         <p:spPr>
           <a:xfrm>
-            <a:off x="8748204" y="1697788"/>
+            <a:off x="8748204" y="2057488"/>
             <a:ext cx="852257" cy="0"/>
           </a:xfrm>
           <a:prstGeom prst="straightConnector1">
@@ -4845,7 +4815,7 @@
         </p:nvSpPr>
         <p:spPr>
           <a:xfrm>
-            <a:off x="9877833" y="1532253"/>
+            <a:off x="9877833" y="1891953"/>
             <a:ext cx="2044878" cy="523220"/>
           </a:xfrm>
           <a:prstGeom prst="rect">
@@ -4861,7 +4831,7 @@
           <a:p>
             <a:r>
               <a:rPr lang="en-SG" sz="1400" dirty="0"/>
-              <a:t>Object picks itself and stays on the same object</a:t>
+              <a:t>Picks the object and stays on the same object</a:t>
             </a:r>
           </a:p>
         </p:txBody>
@@ -5000,51 +4970,6 @@
       </p:cxnSp>
       <p:cxnSp>
         <p:nvCxnSpPr>
-          <p:cNvPr id="190" name="Straight Arrow Connector 189">
-            <a:extLst>
-              <a:ext uri="{FF2B5EF4-FFF2-40B4-BE49-F238E27FC236}">
-                <a16:creationId xmlns:a16="http://schemas.microsoft.com/office/drawing/2014/main" id="{DF61125C-EE19-402A-B6FC-FDD6D7836F84}"/>
-              </a:ext>
-            </a:extLst>
-          </p:cNvPr>
-          <p:cNvCxnSpPr>
-            <a:stCxn id="8" idx="1"/>
-            <a:endCxn id="9" idx="3"/>
-          </p:cNvCxnSpPr>
-          <p:nvPr/>
-        </p:nvCxnSpPr>
-        <p:spPr>
-          <a:xfrm flipH="1">
-            <a:off x="4198398" y="6604530"/>
-            <a:ext cx="726027" cy="0"/>
-          </a:xfrm>
-          <a:prstGeom prst="straightConnector1">
-            <a:avLst/>
-          </a:prstGeom>
-          <a:ln>
-            <a:solidFill>
-              <a:srgbClr val="FF0000"/>
-            </a:solidFill>
-            <a:tailEnd type="triangle"/>
-          </a:ln>
-        </p:spPr>
-        <p:style>
-          <a:lnRef idx="1">
-            <a:schemeClr val="accent1"/>
-          </a:lnRef>
-          <a:fillRef idx="0">
-            <a:schemeClr val="accent1"/>
-          </a:fillRef>
-          <a:effectRef idx="0">
-            <a:schemeClr val="accent1"/>
-          </a:effectRef>
-          <a:fontRef idx="minor">
-            <a:schemeClr val="tx1"/>
-          </a:fontRef>
-        </p:style>
-      </p:cxnSp>
-      <p:cxnSp>
-        <p:nvCxnSpPr>
           <p:cNvPr id="192" name="Straight Arrow Connector 191">
             <a:extLst>
               <a:ext uri="{FF2B5EF4-FFF2-40B4-BE49-F238E27FC236}">
@@ -5237,7 +5162,7 @@
         </p:nvCxnSpPr>
         <p:spPr>
           <a:xfrm>
-            <a:off x="8748204" y="2291247"/>
+            <a:off x="8748205" y="1594625"/>
             <a:ext cx="852257" cy="0"/>
           </a:xfrm>
           <a:prstGeom prst="straightConnector1">
@@ -5279,8 +5204,8 @@
         </p:nvSpPr>
         <p:spPr>
           <a:xfrm>
-            <a:off x="9877833" y="2129106"/>
-            <a:ext cx="2044878" cy="307777"/>
+            <a:off x="9877833" y="1432484"/>
+            <a:ext cx="2044877" cy="307777"/>
           </a:xfrm>
           <a:prstGeom prst="rect">
             <a:avLst/>
@@ -5369,7 +5294,7 @@
           <a:p>
             <a:r>
               <a:rPr lang="en-SG" sz="1400" dirty="0"/>
-              <a:t>Object picks itself and moves to next object</a:t>
+              <a:t>Picks the object and moves to next object</a:t>
             </a:r>
           </a:p>
         </p:txBody>

</xml_diff>

<commit_message>
minor change in comments and changed some cell formatting
</commit_message>
<xml_diff>
--- a/example_class_3/Subproblem graph.pptx
+++ b/example_class_3/Subproblem graph.pptx
@@ -4086,11 +4086,11 @@
           <a:lstStyle/>
           <a:p>
             <a:r>
-              <a:rPr lang="en-SG" dirty="0" err="1"/>
+              <a:rPr lang="en-SG" dirty="0"/>
               <a:t>w</a:t>
             </a:r>
             <a:r>
-              <a:rPr lang="en-SG" baseline="-25000" dirty="0" err="1"/>
+              <a:rPr lang="en-SG" baseline="-25000" dirty="0"/>
               <a:t>i</a:t>
             </a:r>
             <a:endParaRPr lang="en-SG" dirty="0"/>
@@ -6031,11 +6031,17 @@
           <p:cNvGraphicFramePr>
             <a:graphicFrameLocks noGrp="1"/>
           </p:cNvGraphicFramePr>
-          <p:nvPr/>
+          <p:nvPr>
+            <p:extLst>
+              <p:ext uri="{D42A27DB-BD31-4B8C-83A1-F6EECF244321}">
+                <p14:modId xmlns:p14="http://schemas.microsoft.com/office/powerpoint/2010/main" val="2007670705"/>
+              </p:ext>
+            </p:extLst>
+          </p:nvPr>
         </p:nvGraphicFramePr>
         <p:xfrm>
-          <a:off x="2120777" y="337968"/>
-          <a:ext cx="8127999" cy="741680"/>
+          <a:off x="4536594" y="343166"/>
+          <a:ext cx="4368768" cy="741680"/>
         </p:xfrm>
         <a:graphic>
           <a:graphicData uri="http://schemas.openxmlformats.org/drawingml/2006/table">
@@ -6044,21 +6050,21 @@
                 <a:tableStyleId>{5940675A-B579-460E-94D1-54222C63F5DA}</a:tableStyleId>
               </a:tblPr>
               <a:tblGrid>
-                <a:gridCol w="2709333">
+                <a:gridCol w="1456256">
                   <a:extLst>
                     <a:ext uri="{9D8B030D-6E8A-4147-A177-3AD203B41FA5}">
                       <a16:colId xmlns:a16="http://schemas.microsoft.com/office/drawing/2014/main" val="3414537631"/>
                     </a:ext>
                   </a:extLst>
                 </a:gridCol>
-                <a:gridCol w="2709333">
+                <a:gridCol w="1456256">
                   <a:extLst>
                     <a:ext uri="{9D8B030D-6E8A-4147-A177-3AD203B41FA5}">
                       <a16:colId xmlns:a16="http://schemas.microsoft.com/office/drawing/2014/main" val="2094640437"/>
                     </a:ext>
                   </a:extLst>
                 </a:gridCol>
-                <a:gridCol w="2709333">
+                <a:gridCol w="1456256">
                   <a:extLst>
                     <a:ext uri="{9D8B030D-6E8A-4147-A177-3AD203B41FA5}">
                       <a16:colId xmlns:a16="http://schemas.microsoft.com/office/drawing/2014/main" val="3663668123"/>
@@ -6072,6 +6078,7 @@
                     <a:bodyPr/>
                     <a:lstStyle/>
                     <a:p>
+                      <a:pPr algn="ctr"/>
                       <a:r>
                         <a:rPr lang="en-SG" dirty="0"/>
                         <a:t>4</a:t>
@@ -6085,6 +6092,7 @@
                     <a:bodyPr/>
                     <a:lstStyle/>
                     <a:p>
+                      <a:pPr algn="ctr"/>
                       <a:r>
                         <a:rPr lang="en-SG" dirty="0"/>
                         <a:t>6</a:t>
@@ -6098,6 +6106,7 @@
                     <a:bodyPr/>
                     <a:lstStyle/>
                     <a:p>
+                      <a:pPr algn="ctr"/>
                       <a:r>
                         <a:rPr lang="en-SG" dirty="0"/>
                         <a:t>8</a:t>
@@ -6118,6 +6127,7 @@
                     <a:bodyPr/>
                     <a:lstStyle/>
                     <a:p>
+                      <a:pPr algn="ctr"/>
                       <a:r>
                         <a:rPr lang="en-SG" dirty="0"/>
                         <a:t>7</a:t>
@@ -6131,6 +6141,7 @@
                     <a:bodyPr/>
                     <a:lstStyle/>
                     <a:p>
+                      <a:pPr algn="ctr"/>
                       <a:r>
                         <a:rPr lang="en-SG" dirty="0"/>
                         <a:t>6</a:t>
@@ -6144,6 +6155,7 @@
                     <a:bodyPr/>
                     <a:lstStyle/>
                     <a:p>
+                      <a:pPr algn="ctr"/>
                       <a:r>
                         <a:rPr lang="en-SG" dirty="0"/>
                         <a:t>9</a:t>
@@ -6176,8 +6188,8 @@
         </p:nvSpPr>
         <p:spPr>
           <a:xfrm>
-            <a:off x="1025649" y="339476"/>
-            <a:ext cx="790575" cy="369332"/>
+            <a:off x="3692702" y="333445"/>
+            <a:ext cx="424931" cy="369332"/>
           </a:xfrm>
           <a:prstGeom prst="rect">
             <a:avLst/>
@@ -6191,11 +6203,11 @@
           <a:lstStyle/>
           <a:p>
             <a:r>
-              <a:rPr lang="en-SG" dirty="0" err="1"/>
+              <a:rPr lang="en-SG" dirty="0"/>
               <a:t>w</a:t>
             </a:r>
             <a:r>
-              <a:rPr lang="en-SG" baseline="-25000" dirty="0" err="1"/>
+              <a:rPr lang="en-SG" baseline="-25000" dirty="0"/>
               <a:t>i</a:t>
             </a:r>
             <a:endParaRPr lang="en-SG" dirty="0"/>
@@ -6216,8 +6228,8 @@
         </p:nvSpPr>
         <p:spPr>
           <a:xfrm>
-            <a:off x="1025649" y="724602"/>
-            <a:ext cx="790575" cy="369332"/>
+            <a:off x="3692702" y="718571"/>
+            <a:ext cx="424931" cy="369332"/>
           </a:xfrm>
           <a:prstGeom prst="rect">
             <a:avLst/>
@@ -6256,8 +6268,8 @@
         </p:nvSpPr>
         <p:spPr>
           <a:xfrm>
-            <a:off x="2120777" y="-31364"/>
-            <a:ext cx="790575" cy="369332"/>
+            <a:off x="5118731" y="-32558"/>
+            <a:ext cx="424931" cy="369332"/>
           </a:xfrm>
           <a:prstGeom prst="rect">
             <a:avLst/>
@@ -6291,8 +6303,8 @@
         </p:nvSpPr>
         <p:spPr>
           <a:xfrm>
-            <a:off x="4819373" y="-31364"/>
-            <a:ext cx="790575" cy="369332"/>
+            <a:off x="6576855" y="-37044"/>
+            <a:ext cx="424931" cy="369332"/>
           </a:xfrm>
           <a:prstGeom prst="rect">
             <a:avLst/>
@@ -6326,8 +6338,8 @@
         </p:nvSpPr>
         <p:spPr>
           <a:xfrm>
-            <a:off x="7534074" y="-31364"/>
-            <a:ext cx="790575" cy="369332"/>
+            <a:off x="8034979" y="-38951"/>
+            <a:ext cx="424931" cy="369332"/>
           </a:xfrm>
           <a:prstGeom prst="rect">
             <a:avLst/>
@@ -6377,7 +6389,7 @@
           <a:p>
             <a:r>
               <a:rPr lang="en-SG" dirty="0"/>
-              <a:t>(6,2)</a:t>
+              <a:t>(6,3)</a:t>
             </a:r>
           </a:p>
         </p:txBody>
@@ -6611,7 +6623,7 @@
           </p:cNvPr>
           <p:cNvCxnSpPr>
             <a:cxnSpLocks/>
-            <a:stCxn id="7" idx="0"/>
+            <a:stCxn id="7" idx="1"/>
             <a:endCxn id="19" idx="3"/>
           </p:cNvCxnSpPr>
           <p:nvPr/>
@@ -6619,7 +6631,7 @@
         <p:spPr>
           <a:xfrm flipH="1" flipV="1">
             <a:off x="5714999" y="4309865"/>
-            <a:ext cx="1121316" cy="2109999"/>
+            <a:ext cx="726028" cy="2294665"/>
           </a:xfrm>
           <a:prstGeom prst="straightConnector1">
             <a:avLst/>
@@ -6975,7 +6987,7 @@
           </a:xfrm>
           <a:prstGeom prst="bentConnector3">
             <a:avLst>
-              <a:gd name="adj1" fmla="val -3381785"/>
+              <a:gd name="adj1" fmla="val -1449334"/>
             </a:avLst>
           </a:prstGeom>
           <a:ln>
@@ -7019,7 +7031,7 @@
           </a:xfrm>
           <a:prstGeom prst="bentConnector3">
             <a:avLst>
-              <a:gd name="adj1" fmla="val 2090422"/>
+              <a:gd name="adj1" fmla="val 2476909"/>
             </a:avLst>
           </a:prstGeom>
           <a:ln>
@@ -7063,7 +7075,7 @@
           </a:xfrm>
           <a:prstGeom prst="bentConnector3">
             <a:avLst>
-              <a:gd name="adj1" fmla="val -1990422"/>
+              <a:gd name="adj1" fmla="val -4695847"/>
             </a:avLst>
           </a:prstGeom>
           <a:ln>
@@ -7197,13 +7209,13 @@
         </p:spPr>
         <p:style>
           <a:lnRef idx="1">
-            <a:schemeClr val="accent2"/>
+            <a:schemeClr val="accent4"/>
           </a:lnRef>
           <a:fillRef idx="0">
-            <a:schemeClr val="accent2"/>
+            <a:schemeClr val="accent4"/>
           </a:fillRef>
           <a:effectRef idx="0">
-            <a:schemeClr val="accent2"/>
+            <a:schemeClr val="accent4"/>
           </a:effectRef>
           <a:fontRef idx="minor">
             <a:schemeClr val="tx1"/>
@@ -7908,7 +7920,7 @@
           </a:xfrm>
           <a:prstGeom prst="bentConnector3">
             <a:avLst>
-              <a:gd name="adj1" fmla="val 4080498"/>
+              <a:gd name="adj1" fmla="val 6553805"/>
             </a:avLst>
           </a:prstGeom>
           <a:ln>
@@ -8579,6 +8591,41 @@
           </a:fontRef>
         </p:style>
       </p:cxnSp>
+      <p:sp>
+        <p:nvSpPr>
+          <p:cNvPr id="84" name="TextBox 83">
+            <a:extLst>
+              <a:ext uri="{FF2B5EF4-FFF2-40B4-BE49-F238E27FC236}">
+                <a16:creationId xmlns:a16="http://schemas.microsoft.com/office/drawing/2014/main" id="{C16F87D3-6866-41E8-9BB9-787AD1BFF74E}"/>
+              </a:ext>
+            </a:extLst>
+          </p:cNvPr>
+          <p:cNvSpPr txBox="1"/>
+          <p:nvPr/>
+        </p:nvSpPr>
+        <p:spPr>
+          <a:xfrm>
+            <a:off x="3673377" y="-34267"/>
+            <a:ext cx="840281" cy="369332"/>
+          </a:xfrm>
+          <a:prstGeom prst="rect">
+            <a:avLst/>
+          </a:prstGeom>
+          <a:noFill/>
+        </p:spPr>
+        <p:txBody>
+          <a:bodyPr wrap="square" rtlCol="0">
+            <a:spAutoFit/>
+          </a:bodyPr>
+          <a:lstStyle/>
+          <a:p>
+            <a:r>
+              <a:rPr lang="en-SG" dirty="0"/>
+              <a:t>Object</a:t>
+            </a:r>
+          </a:p>
+        </p:txBody>
+      </p:sp>
     </p:spTree>
     <p:extLst>
       <p:ext uri="{BB962C8B-B14F-4D97-AF65-F5344CB8AC3E}">

</xml_diff>

<commit_message>
new subproblem graph and adjusting of slides
</commit_message>
<xml_diff>
--- a/example_class_3/Subproblem graph.pptx
+++ b/example_class_3/Subproblem graph.pptx
@@ -7,6 +7,7 @@
   <p:sldIdLst>
     <p:sldId id="256" r:id="rId2"/>
     <p:sldId id="257" r:id="rId3"/>
+    <p:sldId id="258" r:id="rId4"/>
   </p:sldIdLst>
   <p:sldSz cx="12192000" cy="6858000"/>
   <p:notesSz cx="6858000" cy="9144000"/>
@@ -682,7 +683,7 @@
           <a:p>
             <a:fld id="{3E1B4801-6BF7-4998-8405-2590A5E52B70}" type="datetimeFigureOut">
               <a:rPr lang="en-SG" smtClean="0"/>
-              <a:t>1/11/2021</a:t>
+              <a:t>3/11/2021</a:t>
             </a:fld>
             <a:endParaRPr lang="en-SG"/>
           </a:p>
@@ -882,7 +883,7 @@
           <a:p>
             <a:fld id="{3E1B4801-6BF7-4998-8405-2590A5E52B70}" type="datetimeFigureOut">
               <a:rPr lang="en-SG" smtClean="0"/>
-              <a:t>1/11/2021</a:t>
+              <a:t>3/11/2021</a:t>
             </a:fld>
             <a:endParaRPr lang="en-SG"/>
           </a:p>
@@ -1092,7 +1093,7 @@
           <a:p>
             <a:fld id="{3E1B4801-6BF7-4998-8405-2590A5E52B70}" type="datetimeFigureOut">
               <a:rPr lang="en-SG" smtClean="0"/>
-              <a:t>1/11/2021</a:t>
+              <a:t>3/11/2021</a:t>
             </a:fld>
             <a:endParaRPr lang="en-SG"/>
           </a:p>
@@ -1292,7 +1293,7 @@
           <a:p>
             <a:fld id="{3E1B4801-6BF7-4998-8405-2590A5E52B70}" type="datetimeFigureOut">
               <a:rPr lang="en-SG" smtClean="0"/>
-              <a:t>1/11/2021</a:t>
+              <a:t>3/11/2021</a:t>
             </a:fld>
             <a:endParaRPr lang="en-SG"/>
           </a:p>
@@ -1568,7 +1569,7 @@
           <a:p>
             <a:fld id="{3E1B4801-6BF7-4998-8405-2590A5E52B70}" type="datetimeFigureOut">
               <a:rPr lang="en-SG" smtClean="0"/>
-              <a:t>1/11/2021</a:t>
+              <a:t>3/11/2021</a:t>
             </a:fld>
             <a:endParaRPr lang="en-SG"/>
           </a:p>
@@ -1836,7 +1837,7 @@
           <a:p>
             <a:fld id="{3E1B4801-6BF7-4998-8405-2590A5E52B70}" type="datetimeFigureOut">
               <a:rPr lang="en-SG" smtClean="0"/>
-              <a:t>1/11/2021</a:t>
+              <a:t>3/11/2021</a:t>
             </a:fld>
             <a:endParaRPr lang="en-SG"/>
           </a:p>
@@ -2251,7 +2252,7 @@
           <a:p>
             <a:fld id="{3E1B4801-6BF7-4998-8405-2590A5E52B70}" type="datetimeFigureOut">
               <a:rPr lang="en-SG" smtClean="0"/>
-              <a:t>1/11/2021</a:t>
+              <a:t>3/11/2021</a:t>
             </a:fld>
             <a:endParaRPr lang="en-SG"/>
           </a:p>
@@ -2393,7 +2394,7 @@
           <a:p>
             <a:fld id="{3E1B4801-6BF7-4998-8405-2590A5E52B70}" type="datetimeFigureOut">
               <a:rPr lang="en-SG" smtClean="0"/>
-              <a:t>1/11/2021</a:t>
+              <a:t>3/11/2021</a:t>
             </a:fld>
             <a:endParaRPr lang="en-SG"/>
           </a:p>
@@ -2506,7 +2507,7 @@
           <a:p>
             <a:fld id="{3E1B4801-6BF7-4998-8405-2590A5E52B70}" type="datetimeFigureOut">
               <a:rPr lang="en-SG" smtClean="0"/>
-              <a:t>1/11/2021</a:t>
+              <a:t>3/11/2021</a:t>
             </a:fld>
             <a:endParaRPr lang="en-SG"/>
           </a:p>
@@ -2819,7 +2820,7 @@
           <a:p>
             <a:fld id="{3E1B4801-6BF7-4998-8405-2590A5E52B70}" type="datetimeFigureOut">
               <a:rPr lang="en-SG" smtClean="0"/>
-              <a:t>1/11/2021</a:t>
+              <a:t>3/11/2021</a:t>
             </a:fld>
             <a:endParaRPr lang="en-SG"/>
           </a:p>
@@ -3108,7 +3109,7 @@
           <a:p>
             <a:fld id="{3E1B4801-6BF7-4998-8405-2590A5E52B70}" type="datetimeFigureOut">
               <a:rPr lang="en-SG" smtClean="0"/>
-              <a:t>1/11/2021</a:t>
+              <a:t>3/11/2021</a:t>
             </a:fld>
             <a:endParaRPr lang="en-SG"/>
           </a:p>
@@ -3351,7 +3352,7 @@
           <a:p>
             <a:fld id="{3E1B4801-6BF7-4998-8405-2590A5E52B70}" type="datetimeFigureOut">
               <a:rPr lang="en-SG" smtClean="0"/>
-              <a:t>1/11/2021</a:t>
+              <a:t>3/11/2021</a:t>
             </a:fld>
             <a:endParaRPr lang="en-SG"/>
           </a:p>
@@ -8639,6 +8640,2656 @@
 </p:sld>
 </file>
 
+<file path=ppt/slides/slide3.xml><?xml version="1.0" encoding="utf-8"?>
+<p:sld xmlns:a="http://schemas.openxmlformats.org/drawingml/2006/main" xmlns:r="http://schemas.openxmlformats.org/officeDocument/2006/relationships" xmlns:p="http://schemas.openxmlformats.org/presentationml/2006/main">
+  <p:cSld>
+    <p:spTree>
+      <p:nvGrpSpPr>
+        <p:cNvPr id="1" name=""/>
+        <p:cNvGrpSpPr/>
+        <p:nvPr/>
+      </p:nvGrpSpPr>
+      <p:grpSpPr>
+        <a:xfrm>
+          <a:off x="0" y="0"/>
+          <a:ext cx="0" cy="0"/>
+          <a:chOff x="0" y="0"/>
+          <a:chExt cx="0" cy="0"/>
+        </a:xfrm>
+      </p:grpSpPr>
+      <p:sp>
+        <p:nvSpPr>
+          <p:cNvPr id="4" name="TextBox 3">
+            <a:extLst>
+              <a:ext uri="{FF2B5EF4-FFF2-40B4-BE49-F238E27FC236}">
+                <a16:creationId xmlns:a16="http://schemas.microsoft.com/office/drawing/2014/main" id="{45A54588-128D-40B1-9D2C-7A3E1FF8561C}"/>
+              </a:ext>
+            </a:extLst>
+          </p:cNvPr>
+          <p:cNvSpPr txBox="1"/>
+          <p:nvPr/>
+        </p:nvSpPr>
+        <p:spPr>
+          <a:xfrm>
+            <a:off x="4944918" y="6419864"/>
+            <a:ext cx="790575" cy="369332"/>
+          </a:xfrm>
+          <a:prstGeom prst="rect">
+            <a:avLst/>
+          </a:prstGeom>
+          <a:noFill/>
+        </p:spPr>
+        <p:txBody>
+          <a:bodyPr wrap="square" rtlCol="0">
+            <a:spAutoFit/>
+          </a:bodyPr>
+          <a:lstStyle/>
+          <a:p>
+            <a:r>
+              <a:rPr lang="en-SG" dirty="0"/>
+              <a:t>(14,2)</a:t>
+            </a:r>
+          </a:p>
+        </p:txBody>
+      </p:sp>
+      <p:sp>
+        <p:nvSpPr>
+          <p:cNvPr id="7" name="TextBox 6">
+            <a:extLst>
+              <a:ext uri="{FF2B5EF4-FFF2-40B4-BE49-F238E27FC236}">
+                <a16:creationId xmlns:a16="http://schemas.microsoft.com/office/drawing/2014/main" id="{491A43C3-A295-45AF-ABA5-191BCBE5034B}"/>
+              </a:ext>
+            </a:extLst>
+          </p:cNvPr>
+          <p:cNvSpPr txBox="1"/>
+          <p:nvPr/>
+        </p:nvSpPr>
+        <p:spPr>
+          <a:xfrm>
+            <a:off x="6381775" y="6423695"/>
+            <a:ext cx="790575" cy="369332"/>
+          </a:xfrm>
+          <a:prstGeom prst="rect">
+            <a:avLst/>
+          </a:prstGeom>
+          <a:noFill/>
+        </p:spPr>
+        <p:txBody>
+          <a:bodyPr wrap="square" rtlCol="0">
+            <a:spAutoFit/>
+          </a:bodyPr>
+          <a:lstStyle/>
+          <a:p>
+            <a:r>
+              <a:rPr lang="en-SG" dirty="0"/>
+              <a:t>(14,1)</a:t>
+            </a:r>
+          </a:p>
+        </p:txBody>
+      </p:sp>
+      <p:sp>
+        <p:nvSpPr>
+          <p:cNvPr id="8" name="TextBox 7">
+            <a:extLst>
+              <a:ext uri="{FF2B5EF4-FFF2-40B4-BE49-F238E27FC236}">
+                <a16:creationId xmlns:a16="http://schemas.microsoft.com/office/drawing/2014/main" id="{95AED705-C189-42BA-903C-5DF3E97B3C28}"/>
+              </a:ext>
+            </a:extLst>
+          </p:cNvPr>
+          <p:cNvSpPr txBox="1"/>
+          <p:nvPr/>
+        </p:nvSpPr>
+        <p:spPr>
+          <a:xfrm>
+            <a:off x="7852156" y="6423695"/>
+            <a:ext cx="790575" cy="369332"/>
+          </a:xfrm>
+          <a:prstGeom prst="rect">
+            <a:avLst/>
+          </a:prstGeom>
+          <a:noFill/>
+        </p:spPr>
+        <p:txBody>
+          <a:bodyPr wrap="square" rtlCol="0">
+            <a:spAutoFit/>
+          </a:bodyPr>
+          <a:lstStyle/>
+          <a:p>
+            <a:r>
+              <a:rPr lang="en-SG" dirty="0"/>
+              <a:t>(14,0)</a:t>
+            </a:r>
+          </a:p>
+        </p:txBody>
+      </p:sp>
+      <p:sp>
+        <p:nvSpPr>
+          <p:cNvPr id="9" name="TextBox 8">
+            <a:extLst>
+              <a:ext uri="{FF2B5EF4-FFF2-40B4-BE49-F238E27FC236}">
+                <a16:creationId xmlns:a16="http://schemas.microsoft.com/office/drawing/2014/main" id="{EB364816-47E0-4037-85AF-BF1430F8F921}"/>
+              </a:ext>
+            </a:extLst>
+          </p:cNvPr>
+          <p:cNvSpPr txBox="1"/>
+          <p:nvPr/>
+        </p:nvSpPr>
+        <p:spPr>
+          <a:xfrm>
+            <a:off x="3692869" y="6419864"/>
+            <a:ext cx="790575" cy="369332"/>
+          </a:xfrm>
+          <a:prstGeom prst="rect">
+            <a:avLst/>
+          </a:prstGeom>
+          <a:noFill/>
+        </p:spPr>
+        <p:txBody>
+          <a:bodyPr wrap="square" rtlCol="0">
+            <a:spAutoFit/>
+          </a:bodyPr>
+          <a:lstStyle/>
+          <a:p>
+            <a:r>
+              <a:rPr lang="en-SG" dirty="0">
+                <a:solidFill>
+                  <a:srgbClr val="FF0000"/>
+                </a:solidFill>
+              </a:rPr>
+              <a:t>(14,3)</a:t>
+            </a:r>
+          </a:p>
+        </p:txBody>
+      </p:sp>
+      <p:graphicFrame>
+        <p:nvGraphicFramePr>
+          <p:cNvPr id="10" name="Table 10">
+            <a:extLst>
+              <a:ext uri="{FF2B5EF4-FFF2-40B4-BE49-F238E27FC236}">
+                <a16:creationId xmlns:a16="http://schemas.microsoft.com/office/drawing/2014/main" id="{92210939-B0B0-43BB-B62E-784C50C25F7A}"/>
+              </a:ext>
+            </a:extLst>
+          </p:cNvPr>
+          <p:cNvGraphicFramePr>
+            <a:graphicFrameLocks noGrp="1"/>
+          </p:cNvGraphicFramePr>
+          <p:nvPr>
+            <p:extLst>
+              <p:ext uri="{D42A27DB-BD31-4B8C-83A1-F6EECF244321}">
+                <p14:modId xmlns:p14="http://schemas.microsoft.com/office/powerpoint/2010/main" val="4064260959"/>
+              </p:ext>
+            </p:extLst>
+          </p:nvPr>
+        </p:nvGraphicFramePr>
+        <p:xfrm>
+          <a:off x="4536594" y="343166"/>
+          <a:ext cx="4368768" cy="741680"/>
+        </p:xfrm>
+        <a:graphic>
+          <a:graphicData uri="http://schemas.openxmlformats.org/drawingml/2006/table">
+            <a:tbl>
+              <a:tblPr firstRow="1" bandRow="1">
+                <a:tableStyleId>{5940675A-B579-460E-94D1-54222C63F5DA}</a:tableStyleId>
+              </a:tblPr>
+              <a:tblGrid>
+                <a:gridCol w="1456256">
+                  <a:extLst>
+                    <a:ext uri="{9D8B030D-6E8A-4147-A177-3AD203B41FA5}">
+                      <a16:colId xmlns:a16="http://schemas.microsoft.com/office/drawing/2014/main" val="3414537631"/>
+                    </a:ext>
+                  </a:extLst>
+                </a:gridCol>
+                <a:gridCol w="1456256">
+                  <a:extLst>
+                    <a:ext uri="{9D8B030D-6E8A-4147-A177-3AD203B41FA5}">
+                      <a16:colId xmlns:a16="http://schemas.microsoft.com/office/drawing/2014/main" val="2094640437"/>
+                    </a:ext>
+                  </a:extLst>
+                </a:gridCol>
+                <a:gridCol w="1456256">
+                  <a:extLst>
+                    <a:ext uri="{9D8B030D-6E8A-4147-A177-3AD203B41FA5}">
+                      <a16:colId xmlns:a16="http://schemas.microsoft.com/office/drawing/2014/main" val="3663668123"/>
+                    </a:ext>
+                  </a:extLst>
+                </a:gridCol>
+              </a:tblGrid>
+              <a:tr h="370840">
+                <a:tc>
+                  <a:txBody>
+                    <a:bodyPr/>
+                    <a:lstStyle/>
+                    <a:p>
+                      <a:pPr algn="ctr"/>
+                      <a:r>
+                        <a:rPr lang="en-SG" dirty="0"/>
+                        <a:t>8</a:t>
+                      </a:r>
+                    </a:p>
+                  </a:txBody>
+                  <a:tcPr/>
+                </a:tc>
+                <a:tc>
+                  <a:txBody>
+                    <a:bodyPr/>
+                    <a:lstStyle/>
+                    <a:p>
+                      <a:pPr algn="ctr"/>
+                      <a:r>
+                        <a:rPr lang="en-SG" dirty="0"/>
+                        <a:t>6</a:t>
+                      </a:r>
+                    </a:p>
+                  </a:txBody>
+                  <a:tcPr/>
+                </a:tc>
+                <a:tc>
+                  <a:txBody>
+                    <a:bodyPr/>
+                    <a:lstStyle/>
+                    <a:p>
+                      <a:pPr algn="ctr"/>
+                      <a:r>
+                        <a:rPr lang="en-SG" dirty="0"/>
+                        <a:t>4</a:t>
+                      </a:r>
+                    </a:p>
+                  </a:txBody>
+                  <a:tcPr/>
+                </a:tc>
+                <a:extLst>
+                  <a:ext uri="{0D108BD9-81ED-4DB2-BD59-A6C34878D82A}">
+                    <a16:rowId xmlns:a16="http://schemas.microsoft.com/office/drawing/2014/main" val="4080450041"/>
+                  </a:ext>
+                </a:extLst>
+              </a:tr>
+              <a:tr h="370840">
+                <a:tc>
+                  <a:txBody>
+                    <a:bodyPr/>
+                    <a:lstStyle/>
+                    <a:p>
+                      <a:pPr algn="ctr"/>
+                      <a:r>
+                        <a:rPr lang="en-SG" dirty="0"/>
+                        <a:t>9</a:t>
+                      </a:r>
+                    </a:p>
+                  </a:txBody>
+                  <a:tcPr/>
+                </a:tc>
+                <a:tc>
+                  <a:txBody>
+                    <a:bodyPr/>
+                    <a:lstStyle/>
+                    <a:p>
+                      <a:pPr algn="ctr"/>
+                      <a:r>
+                        <a:rPr lang="en-SG" dirty="0"/>
+                        <a:t>6</a:t>
+                      </a:r>
+                    </a:p>
+                  </a:txBody>
+                  <a:tcPr/>
+                </a:tc>
+                <a:tc>
+                  <a:txBody>
+                    <a:bodyPr/>
+                    <a:lstStyle/>
+                    <a:p>
+                      <a:pPr algn="ctr"/>
+                      <a:r>
+                        <a:rPr lang="en-SG" dirty="0"/>
+                        <a:t>7</a:t>
+                      </a:r>
+                    </a:p>
+                  </a:txBody>
+                  <a:tcPr/>
+                </a:tc>
+                <a:extLst>
+                  <a:ext uri="{0D108BD9-81ED-4DB2-BD59-A6C34878D82A}">
+                    <a16:rowId xmlns:a16="http://schemas.microsoft.com/office/drawing/2014/main" val="2746242991"/>
+                  </a:ext>
+                </a:extLst>
+              </a:tr>
+            </a:tbl>
+          </a:graphicData>
+        </a:graphic>
+      </p:graphicFrame>
+      <p:sp>
+        <p:nvSpPr>
+          <p:cNvPr id="11" name="TextBox 10">
+            <a:extLst>
+              <a:ext uri="{FF2B5EF4-FFF2-40B4-BE49-F238E27FC236}">
+                <a16:creationId xmlns:a16="http://schemas.microsoft.com/office/drawing/2014/main" id="{DB39358C-43A1-4EA4-BE03-0C939EABAE8A}"/>
+              </a:ext>
+            </a:extLst>
+          </p:cNvPr>
+          <p:cNvSpPr txBox="1"/>
+          <p:nvPr/>
+        </p:nvSpPr>
+        <p:spPr>
+          <a:xfrm>
+            <a:off x="3692702" y="333445"/>
+            <a:ext cx="424931" cy="369332"/>
+          </a:xfrm>
+          <a:prstGeom prst="rect">
+            <a:avLst/>
+          </a:prstGeom>
+          <a:noFill/>
+        </p:spPr>
+        <p:txBody>
+          <a:bodyPr wrap="square" rtlCol="0">
+            <a:spAutoFit/>
+          </a:bodyPr>
+          <a:lstStyle/>
+          <a:p>
+            <a:r>
+              <a:rPr lang="en-SG" dirty="0"/>
+              <a:t>w</a:t>
+            </a:r>
+            <a:r>
+              <a:rPr lang="en-SG" baseline="-25000" dirty="0"/>
+              <a:t>i</a:t>
+            </a:r>
+            <a:endParaRPr lang="en-SG" dirty="0"/>
+          </a:p>
+        </p:txBody>
+      </p:sp>
+      <p:sp>
+        <p:nvSpPr>
+          <p:cNvPr id="12" name="TextBox 11">
+            <a:extLst>
+              <a:ext uri="{FF2B5EF4-FFF2-40B4-BE49-F238E27FC236}">
+                <a16:creationId xmlns:a16="http://schemas.microsoft.com/office/drawing/2014/main" id="{F865BA7A-6AB6-40A0-9228-697A6C807584}"/>
+              </a:ext>
+            </a:extLst>
+          </p:cNvPr>
+          <p:cNvSpPr txBox="1"/>
+          <p:nvPr/>
+        </p:nvSpPr>
+        <p:spPr>
+          <a:xfrm>
+            <a:off x="3692702" y="718571"/>
+            <a:ext cx="424931" cy="369332"/>
+          </a:xfrm>
+          <a:prstGeom prst="rect">
+            <a:avLst/>
+          </a:prstGeom>
+          <a:noFill/>
+        </p:spPr>
+        <p:txBody>
+          <a:bodyPr wrap="square" rtlCol="0">
+            <a:spAutoFit/>
+          </a:bodyPr>
+          <a:lstStyle/>
+          <a:p>
+            <a:r>
+              <a:rPr lang="en-SG" dirty="0"/>
+              <a:t>p</a:t>
+            </a:r>
+            <a:r>
+              <a:rPr lang="en-SG" baseline="-25000" dirty="0"/>
+              <a:t>i</a:t>
+            </a:r>
+            <a:endParaRPr lang="en-SG" dirty="0"/>
+          </a:p>
+        </p:txBody>
+      </p:sp>
+      <p:sp>
+        <p:nvSpPr>
+          <p:cNvPr id="13" name="TextBox 12">
+            <a:extLst>
+              <a:ext uri="{FF2B5EF4-FFF2-40B4-BE49-F238E27FC236}">
+                <a16:creationId xmlns:a16="http://schemas.microsoft.com/office/drawing/2014/main" id="{A90903DC-EB67-4240-93ED-7D5E43792C62}"/>
+              </a:ext>
+            </a:extLst>
+          </p:cNvPr>
+          <p:cNvSpPr txBox="1"/>
+          <p:nvPr/>
+        </p:nvSpPr>
+        <p:spPr>
+          <a:xfrm>
+            <a:off x="5118731" y="-32558"/>
+            <a:ext cx="424931" cy="369332"/>
+          </a:xfrm>
+          <a:prstGeom prst="rect">
+            <a:avLst/>
+          </a:prstGeom>
+          <a:noFill/>
+        </p:spPr>
+        <p:txBody>
+          <a:bodyPr wrap="square" rtlCol="0">
+            <a:spAutoFit/>
+          </a:bodyPr>
+          <a:lstStyle/>
+          <a:p>
+            <a:r>
+              <a:rPr lang="en-SG" dirty="0"/>
+              <a:t>2</a:t>
+            </a:r>
+          </a:p>
+        </p:txBody>
+      </p:sp>
+      <p:sp>
+        <p:nvSpPr>
+          <p:cNvPr id="14" name="TextBox 13">
+            <a:extLst>
+              <a:ext uri="{FF2B5EF4-FFF2-40B4-BE49-F238E27FC236}">
+                <a16:creationId xmlns:a16="http://schemas.microsoft.com/office/drawing/2014/main" id="{8A793BD3-C00D-45BB-B727-857382FE832F}"/>
+              </a:ext>
+            </a:extLst>
+          </p:cNvPr>
+          <p:cNvSpPr txBox="1"/>
+          <p:nvPr/>
+        </p:nvSpPr>
+        <p:spPr>
+          <a:xfrm>
+            <a:off x="6576855" y="-37044"/>
+            <a:ext cx="424931" cy="369332"/>
+          </a:xfrm>
+          <a:prstGeom prst="rect">
+            <a:avLst/>
+          </a:prstGeom>
+          <a:noFill/>
+        </p:spPr>
+        <p:txBody>
+          <a:bodyPr wrap="square" rtlCol="0">
+            <a:spAutoFit/>
+          </a:bodyPr>
+          <a:lstStyle/>
+          <a:p>
+            <a:r>
+              <a:rPr lang="en-SG" dirty="0"/>
+              <a:t>1</a:t>
+            </a:r>
+          </a:p>
+        </p:txBody>
+      </p:sp>
+      <p:sp>
+        <p:nvSpPr>
+          <p:cNvPr id="15" name="TextBox 14">
+            <a:extLst>
+              <a:ext uri="{FF2B5EF4-FFF2-40B4-BE49-F238E27FC236}">
+                <a16:creationId xmlns:a16="http://schemas.microsoft.com/office/drawing/2014/main" id="{6480A226-5C04-4847-B9E7-01D9E4E48D87}"/>
+              </a:ext>
+            </a:extLst>
+          </p:cNvPr>
+          <p:cNvSpPr txBox="1"/>
+          <p:nvPr/>
+        </p:nvSpPr>
+        <p:spPr>
+          <a:xfrm>
+            <a:off x="8034979" y="-38951"/>
+            <a:ext cx="424931" cy="369332"/>
+          </a:xfrm>
+          <a:prstGeom prst="rect">
+            <a:avLst/>
+          </a:prstGeom>
+          <a:noFill/>
+        </p:spPr>
+        <p:txBody>
+          <a:bodyPr wrap="square" rtlCol="0">
+            <a:spAutoFit/>
+          </a:bodyPr>
+          <a:lstStyle/>
+          <a:p>
+            <a:r>
+              <a:rPr lang="en-SG" dirty="0"/>
+              <a:t>0</a:t>
+            </a:r>
+          </a:p>
+        </p:txBody>
+      </p:sp>
+      <p:sp>
+        <p:nvSpPr>
+          <p:cNvPr id="16" name="TextBox 15">
+            <a:extLst>
+              <a:ext uri="{FF2B5EF4-FFF2-40B4-BE49-F238E27FC236}">
+                <a16:creationId xmlns:a16="http://schemas.microsoft.com/office/drawing/2014/main" id="{4D7E6938-7FCC-4488-A4DD-CFB1B916DDC0}"/>
+              </a:ext>
+            </a:extLst>
+          </p:cNvPr>
+          <p:cNvSpPr txBox="1"/>
+          <p:nvPr/>
+        </p:nvSpPr>
+        <p:spPr>
+          <a:xfrm>
+            <a:off x="4944918" y="3425225"/>
+            <a:ext cx="790575" cy="369332"/>
+          </a:xfrm>
+          <a:prstGeom prst="rect">
+            <a:avLst/>
+          </a:prstGeom>
+          <a:noFill/>
+        </p:spPr>
+        <p:txBody>
+          <a:bodyPr wrap="square" rtlCol="0">
+            <a:spAutoFit/>
+          </a:bodyPr>
+          <a:lstStyle/>
+          <a:p>
+            <a:r>
+              <a:rPr lang="en-SG" dirty="0"/>
+              <a:t>(6,2)</a:t>
+            </a:r>
+          </a:p>
+        </p:txBody>
+      </p:sp>
+      <p:sp>
+        <p:nvSpPr>
+          <p:cNvPr id="17" name="TextBox 16">
+            <a:extLst>
+              <a:ext uri="{FF2B5EF4-FFF2-40B4-BE49-F238E27FC236}">
+                <a16:creationId xmlns:a16="http://schemas.microsoft.com/office/drawing/2014/main" id="{334202F6-D33A-41F2-BC9D-2378E61FE5C4}"/>
+              </a:ext>
+            </a:extLst>
+          </p:cNvPr>
+          <p:cNvSpPr txBox="1"/>
+          <p:nvPr/>
+        </p:nvSpPr>
+        <p:spPr>
+          <a:xfrm>
+            <a:off x="6414528" y="3426053"/>
+            <a:ext cx="757822" cy="369332"/>
+          </a:xfrm>
+          <a:prstGeom prst="rect">
+            <a:avLst/>
+          </a:prstGeom>
+          <a:noFill/>
+        </p:spPr>
+        <p:txBody>
+          <a:bodyPr wrap="square" rtlCol="0">
+            <a:spAutoFit/>
+          </a:bodyPr>
+          <a:lstStyle/>
+          <a:p>
+            <a:r>
+              <a:rPr lang="en-SG" dirty="0"/>
+              <a:t>(6,1)</a:t>
+            </a:r>
+          </a:p>
+        </p:txBody>
+      </p:sp>
+      <p:sp>
+        <p:nvSpPr>
+          <p:cNvPr id="18" name="TextBox 17">
+            <a:extLst>
+              <a:ext uri="{FF2B5EF4-FFF2-40B4-BE49-F238E27FC236}">
+                <a16:creationId xmlns:a16="http://schemas.microsoft.com/office/drawing/2014/main" id="{EFA1AEE6-1AC5-4CAB-B7A5-EA4C26E575C6}"/>
+              </a:ext>
+            </a:extLst>
+          </p:cNvPr>
+          <p:cNvSpPr txBox="1"/>
+          <p:nvPr/>
+        </p:nvSpPr>
+        <p:spPr>
+          <a:xfrm>
+            <a:off x="6403043" y="4119836"/>
+            <a:ext cx="652231" cy="369332"/>
+          </a:xfrm>
+          <a:prstGeom prst="rect">
+            <a:avLst/>
+          </a:prstGeom>
+          <a:noFill/>
+        </p:spPr>
+        <p:txBody>
+          <a:bodyPr wrap="square" rtlCol="0">
+            <a:spAutoFit/>
+          </a:bodyPr>
+          <a:lstStyle/>
+          <a:p>
+            <a:r>
+              <a:rPr lang="en-SG" dirty="0"/>
+              <a:t>(8,1)</a:t>
+            </a:r>
+          </a:p>
+        </p:txBody>
+      </p:sp>
+      <p:sp>
+        <p:nvSpPr>
+          <p:cNvPr id="20" name="TextBox 19">
+            <a:extLst>
+              <a:ext uri="{FF2B5EF4-FFF2-40B4-BE49-F238E27FC236}">
+                <a16:creationId xmlns:a16="http://schemas.microsoft.com/office/drawing/2014/main" id="{35C3215D-D6B5-4E08-B0FE-A267A2FFBA23}"/>
+              </a:ext>
+            </a:extLst>
+          </p:cNvPr>
+          <p:cNvSpPr txBox="1"/>
+          <p:nvPr/>
+        </p:nvSpPr>
+        <p:spPr>
+          <a:xfrm>
+            <a:off x="7831523" y="4861970"/>
+            <a:ext cx="790575" cy="369332"/>
+          </a:xfrm>
+          <a:prstGeom prst="rect">
+            <a:avLst/>
+          </a:prstGeom>
+          <a:noFill/>
+        </p:spPr>
+        <p:txBody>
+          <a:bodyPr wrap="square" rtlCol="0">
+            <a:spAutoFit/>
+          </a:bodyPr>
+          <a:lstStyle/>
+          <a:p>
+            <a:r>
+              <a:rPr lang="en-SG" dirty="0"/>
+              <a:t>(10,0)</a:t>
+            </a:r>
+          </a:p>
+        </p:txBody>
+      </p:sp>
+      <p:sp>
+        <p:nvSpPr>
+          <p:cNvPr id="45" name="TextBox 44">
+            <a:extLst>
+              <a:ext uri="{FF2B5EF4-FFF2-40B4-BE49-F238E27FC236}">
+                <a16:creationId xmlns:a16="http://schemas.microsoft.com/office/drawing/2014/main" id="{5881B72F-8DCE-4E12-8C97-2566C5089006}"/>
+              </a:ext>
+            </a:extLst>
+          </p:cNvPr>
+          <p:cNvSpPr txBox="1"/>
+          <p:nvPr/>
+        </p:nvSpPr>
+        <p:spPr>
+          <a:xfrm>
+            <a:off x="6403043" y="1220872"/>
+            <a:ext cx="652231" cy="369332"/>
+          </a:xfrm>
+          <a:prstGeom prst="rect">
+            <a:avLst/>
+          </a:prstGeom>
+          <a:noFill/>
+        </p:spPr>
+        <p:txBody>
+          <a:bodyPr wrap="square" rtlCol="0">
+            <a:spAutoFit/>
+          </a:bodyPr>
+          <a:lstStyle/>
+          <a:p>
+            <a:r>
+              <a:rPr lang="en-SG" dirty="0">
+                <a:solidFill>
+                  <a:srgbClr val="FF0000"/>
+                </a:solidFill>
+              </a:rPr>
+              <a:t>(0,1)</a:t>
+            </a:r>
+          </a:p>
+        </p:txBody>
+      </p:sp>
+      <p:sp>
+        <p:nvSpPr>
+          <p:cNvPr id="106" name="TextBox 105">
+            <a:extLst>
+              <a:ext uri="{FF2B5EF4-FFF2-40B4-BE49-F238E27FC236}">
+                <a16:creationId xmlns:a16="http://schemas.microsoft.com/office/drawing/2014/main" id="{F3DA0EC2-7A69-4D20-A23A-C000D9723445}"/>
+              </a:ext>
+            </a:extLst>
+          </p:cNvPr>
+          <p:cNvSpPr txBox="1"/>
+          <p:nvPr/>
+        </p:nvSpPr>
+        <p:spPr>
+          <a:xfrm>
+            <a:off x="3692871" y="1955999"/>
+            <a:ext cx="790575" cy="369332"/>
+          </a:xfrm>
+          <a:prstGeom prst="rect">
+            <a:avLst/>
+          </a:prstGeom>
+          <a:noFill/>
+        </p:spPr>
+        <p:txBody>
+          <a:bodyPr wrap="square" rtlCol="0">
+            <a:spAutoFit/>
+          </a:bodyPr>
+          <a:lstStyle/>
+          <a:p>
+            <a:r>
+              <a:rPr lang="en-SG" dirty="0">
+                <a:solidFill>
+                  <a:srgbClr val="FF0000"/>
+                </a:solidFill>
+              </a:rPr>
+              <a:t>(2,3)</a:t>
+            </a:r>
+          </a:p>
+        </p:txBody>
+      </p:sp>
+      <p:sp>
+        <p:nvSpPr>
+          <p:cNvPr id="107" name="TextBox 106">
+            <a:extLst>
+              <a:ext uri="{FF2B5EF4-FFF2-40B4-BE49-F238E27FC236}">
+                <a16:creationId xmlns:a16="http://schemas.microsoft.com/office/drawing/2014/main" id="{1EB61DB3-7AEE-430E-B825-D8838F179EA3}"/>
+              </a:ext>
+            </a:extLst>
+          </p:cNvPr>
+          <p:cNvSpPr txBox="1"/>
+          <p:nvPr/>
+        </p:nvSpPr>
+        <p:spPr>
+          <a:xfrm>
+            <a:off x="3688432" y="1217041"/>
+            <a:ext cx="790575" cy="369332"/>
+          </a:xfrm>
+          <a:prstGeom prst="rect">
+            <a:avLst/>
+          </a:prstGeom>
+          <a:noFill/>
+        </p:spPr>
+        <p:txBody>
+          <a:bodyPr wrap="square" rtlCol="0">
+            <a:spAutoFit/>
+          </a:bodyPr>
+          <a:lstStyle/>
+          <a:p>
+            <a:r>
+              <a:rPr lang="en-SG" dirty="0">
+                <a:solidFill>
+                  <a:srgbClr val="FF0000"/>
+                </a:solidFill>
+              </a:rPr>
+              <a:t>(0,3)</a:t>
+            </a:r>
+          </a:p>
+        </p:txBody>
+      </p:sp>
+      <p:sp>
+        <p:nvSpPr>
+          <p:cNvPr id="110" name="TextBox 109">
+            <a:extLst>
+              <a:ext uri="{FF2B5EF4-FFF2-40B4-BE49-F238E27FC236}">
+                <a16:creationId xmlns:a16="http://schemas.microsoft.com/office/drawing/2014/main" id="{F927B82C-64EB-438E-89D1-437AA62EB1E1}"/>
+              </a:ext>
+            </a:extLst>
+          </p:cNvPr>
+          <p:cNvSpPr txBox="1"/>
+          <p:nvPr/>
+        </p:nvSpPr>
+        <p:spPr>
+          <a:xfrm>
+            <a:off x="7852155" y="3425225"/>
+            <a:ext cx="790575" cy="369332"/>
+          </a:xfrm>
+          <a:prstGeom prst="rect">
+            <a:avLst/>
+          </a:prstGeom>
+          <a:noFill/>
+        </p:spPr>
+        <p:txBody>
+          <a:bodyPr wrap="square" rtlCol="0">
+            <a:spAutoFit/>
+          </a:bodyPr>
+          <a:lstStyle/>
+          <a:p>
+            <a:r>
+              <a:rPr lang="en-SG" dirty="0"/>
+              <a:t>(6,0)</a:t>
+            </a:r>
+          </a:p>
+        </p:txBody>
+      </p:sp>
+      <p:sp>
+        <p:nvSpPr>
+          <p:cNvPr id="115" name="TextBox 114">
+            <a:extLst>
+              <a:ext uri="{FF2B5EF4-FFF2-40B4-BE49-F238E27FC236}">
+                <a16:creationId xmlns:a16="http://schemas.microsoft.com/office/drawing/2014/main" id="{E94B7D70-7D90-4A10-AE9B-5FBDC524F5BE}"/>
+              </a:ext>
+            </a:extLst>
+          </p:cNvPr>
+          <p:cNvSpPr txBox="1"/>
+          <p:nvPr/>
+        </p:nvSpPr>
+        <p:spPr>
+          <a:xfrm>
+            <a:off x="6414528" y="1953812"/>
+            <a:ext cx="779090" cy="369332"/>
+          </a:xfrm>
+          <a:prstGeom prst="rect">
+            <a:avLst/>
+          </a:prstGeom>
+          <a:noFill/>
+        </p:spPr>
+        <p:txBody>
+          <a:bodyPr wrap="square" rtlCol="0">
+            <a:spAutoFit/>
+          </a:bodyPr>
+          <a:lstStyle/>
+          <a:p>
+            <a:r>
+              <a:rPr lang="en-SG" dirty="0"/>
+              <a:t>(2,1)</a:t>
+            </a:r>
+          </a:p>
+        </p:txBody>
+      </p:sp>
+      <p:sp>
+        <p:nvSpPr>
+          <p:cNvPr id="156" name="TextBox 155">
+            <a:extLst>
+              <a:ext uri="{FF2B5EF4-FFF2-40B4-BE49-F238E27FC236}">
+                <a16:creationId xmlns:a16="http://schemas.microsoft.com/office/drawing/2014/main" id="{1BE056E4-F2AE-4DA6-B4DD-8456958C9D31}"/>
+              </a:ext>
+            </a:extLst>
+          </p:cNvPr>
+          <p:cNvSpPr txBox="1"/>
+          <p:nvPr/>
+        </p:nvSpPr>
+        <p:spPr>
+          <a:xfrm>
+            <a:off x="3692869" y="3429650"/>
+            <a:ext cx="790575" cy="369332"/>
+          </a:xfrm>
+          <a:prstGeom prst="rect">
+            <a:avLst/>
+          </a:prstGeom>
+          <a:noFill/>
+        </p:spPr>
+        <p:txBody>
+          <a:bodyPr wrap="square" rtlCol="0">
+            <a:spAutoFit/>
+          </a:bodyPr>
+          <a:lstStyle/>
+          <a:p>
+            <a:r>
+              <a:rPr lang="en-SG" dirty="0">
+                <a:solidFill>
+                  <a:srgbClr val="FF0000"/>
+                </a:solidFill>
+              </a:rPr>
+              <a:t>(6,3)</a:t>
+            </a:r>
+          </a:p>
+        </p:txBody>
+      </p:sp>
+      <p:cxnSp>
+        <p:nvCxnSpPr>
+          <p:cNvPr id="164" name="Straight Arrow Connector 163">
+            <a:extLst>
+              <a:ext uri="{FF2B5EF4-FFF2-40B4-BE49-F238E27FC236}">
+                <a16:creationId xmlns:a16="http://schemas.microsoft.com/office/drawing/2014/main" id="{551AB59B-3D29-42B1-9748-D33DC5177989}"/>
+              </a:ext>
+            </a:extLst>
+          </p:cNvPr>
+          <p:cNvCxnSpPr>
+            <a:cxnSpLocks/>
+          </p:cNvCxnSpPr>
+          <p:nvPr/>
+        </p:nvCxnSpPr>
+        <p:spPr>
+          <a:xfrm>
+            <a:off x="103851" y="345751"/>
+            <a:ext cx="852257" cy="0"/>
+          </a:xfrm>
+          <a:prstGeom prst="straightConnector1">
+            <a:avLst/>
+          </a:prstGeom>
+          <a:ln>
+            <a:tailEnd type="triangle"/>
+          </a:ln>
+        </p:spPr>
+        <p:style>
+          <a:lnRef idx="1">
+            <a:schemeClr val="accent4"/>
+          </a:lnRef>
+          <a:fillRef idx="0">
+            <a:schemeClr val="accent4"/>
+          </a:fillRef>
+          <a:effectRef idx="0">
+            <a:schemeClr val="accent4"/>
+          </a:effectRef>
+          <a:fontRef idx="minor">
+            <a:schemeClr val="tx1"/>
+          </a:fontRef>
+        </p:style>
+      </p:cxnSp>
+      <p:sp>
+        <p:nvSpPr>
+          <p:cNvPr id="172" name="TextBox 171">
+            <a:extLst>
+              <a:ext uri="{FF2B5EF4-FFF2-40B4-BE49-F238E27FC236}">
+                <a16:creationId xmlns:a16="http://schemas.microsoft.com/office/drawing/2014/main" id="{AE210B36-55ED-443A-98A0-48FFD486BB08}"/>
+              </a:ext>
+            </a:extLst>
+          </p:cNvPr>
+          <p:cNvSpPr txBox="1"/>
+          <p:nvPr/>
+        </p:nvSpPr>
+        <p:spPr>
+          <a:xfrm>
+            <a:off x="1233480" y="180216"/>
+            <a:ext cx="2044878" cy="523220"/>
+          </a:xfrm>
+          <a:prstGeom prst="rect">
+            <a:avLst/>
+          </a:prstGeom>
+          <a:noFill/>
+        </p:spPr>
+        <p:txBody>
+          <a:bodyPr wrap="square" rtlCol="0">
+            <a:spAutoFit/>
+          </a:bodyPr>
+          <a:lstStyle/>
+          <a:p>
+            <a:r>
+              <a:rPr lang="en-SG" sz="1400" dirty="0"/>
+              <a:t>Object picks itself and stays on the same object</a:t>
+            </a:r>
+          </a:p>
+        </p:txBody>
+      </p:sp>
+      <p:cxnSp>
+        <p:nvCxnSpPr>
+          <p:cNvPr id="200" name="Straight Arrow Connector 199">
+            <a:extLst>
+              <a:ext uri="{FF2B5EF4-FFF2-40B4-BE49-F238E27FC236}">
+                <a16:creationId xmlns:a16="http://schemas.microsoft.com/office/drawing/2014/main" id="{215BE038-0936-43F7-BF75-7CAF1B0CABEF}"/>
+              </a:ext>
+            </a:extLst>
+          </p:cNvPr>
+          <p:cNvCxnSpPr/>
+          <p:nvPr/>
+        </p:nvCxnSpPr>
+        <p:spPr>
+          <a:xfrm>
+            <a:off x="103851" y="939210"/>
+            <a:ext cx="852257" cy="0"/>
+          </a:xfrm>
+          <a:prstGeom prst="straightConnector1">
+            <a:avLst/>
+          </a:prstGeom>
+          <a:ln>
+            <a:tailEnd type="triangle"/>
+          </a:ln>
+        </p:spPr>
+        <p:style>
+          <a:lnRef idx="1">
+            <a:schemeClr val="accent1"/>
+          </a:lnRef>
+          <a:fillRef idx="0">
+            <a:schemeClr val="accent1"/>
+          </a:fillRef>
+          <a:effectRef idx="0">
+            <a:schemeClr val="accent1"/>
+          </a:effectRef>
+          <a:fontRef idx="minor">
+            <a:schemeClr val="tx1"/>
+          </a:fontRef>
+        </p:style>
+      </p:cxnSp>
+      <p:sp>
+        <p:nvSpPr>
+          <p:cNvPr id="201" name="TextBox 200">
+            <a:extLst>
+              <a:ext uri="{FF2B5EF4-FFF2-40B4-BE49-F238E27FC236}">
+                <a16:creationId xmlns:a16="http://schemas.microsoft.com/office/drawing/2014/main" id="{0149B2B8-1100-4FDD-A47F-9CA80B2D2B30}"/>
+              </a:ext>
+            </a:extLst>
+          </p:cNvPr>
+          <p:cNvSpPr txBox="1"/>
+          <p:nvPr/>
+        </p:nvSpPr>
+        <p:spPr>
+          <a:xfrm>
+            <a:off x="1233480" y="777069"/>
+            <a:ext cx="2044878" cy="307777"/>
+          </a:xfrm>
+          <a:prstGeom prst="rect">
+            <a:avLst/>
+          </a:prstGeom>
+          <a:noFill/>
+        </p:spPr>
+        <p:txBody>
+          <a:bodyPr wrap="square" rtlCol="0">
+            <a:spAutoFit/>
+          </a:bodyPr>
+          <a:lstStyle/>
+          <a:p>
+            <a:r>
+              <a:rPr lang="en-SG" sz="1400" dirty="0"/>
+              <a:t>Does not pick any object</a:t>
+            </a:r>
+          </a:p>
+        </p:txBody>
+      </p:sp>
+      <p:sp>
+        <p:nvSpPr>
+          <p:cNvPr id="105" name="TextBox 104">
+            <a:extLst>
+              <a:ext uri="{FF2B5EF4-FFF2-40B4-BE49-F238E27FC236}">
+                <a16:creationId xmlns:a16="http://schemas.microsoft.com/office/drawing/2014/main" id="{D38F4482-985F-4E48-9BB4-B703DBA07EEB}"/>
+              </a:ext>
+            </a:extLst>
+          </p:cNvPr>
+          <p:cNvSpPr txBox="1"/>
+          <p:nvPr/>
+        </p:nvSpPr>
+        <p:spPr>
+          <a:xfrm>
+            <a:off x="3692871" y="4119836"/>
+            <a:ext cx="790575" cy="369332"/>
+          </a:xfrm>
+          <a:prstGeom prst="rect">
+            <a:avLst/>
+          </a:prstGeom>
+          <a:noFill/>
+        </p:spPr>
+        <p:txBody>
+          <a:bodyPr wrap="square" rtlCol="0">
+            <a:spAutoFit/>
+          </a:bodyPr>
+          <a:lstStyle/>
+          <a:p>
+            <a:r>
+              <a:rPr lang="en-SG" dirty="0">
+                <a:solidFill>
+                  <a:srgbClr val="FF0000"/>
+                </a:solidFill>
+              </a:rPr>
+              <a:t>(8,3)</a:t>
+            </a:r>
+          </a:p>
+        </p:txBody>
+      </p:sp>
+      <p:sp>
+        <p:nvSpPr>
+          <p:cNvPr id="135" name="TextBox 134">
+            <a:extLst>
+              <a:ext uri="{FF2B5EF4-FFF2-40B4-BE49-F238E27FC236}">
+                <a16:creationId xmlns:a16="http://schemas.microsoft.com/office/drawing/2014/main" id="{3C50A6A4-E52A-490A-95FD-F8902FD8AEF4}"/>
+              </a:ext>
+            </a:extLst>
+          </p:cNvPr>
+          <p:cNvSpPr txBox="1"/>
+          <p:nvPr/>
+        </p:nvSpPr>
+        <p:spPr>
+          <a:xfrm>
+            <a:off x="3685668" y="4861970"/>
+            <a:ext cx="790575" cy="369332"/>
+          </a:xfrm>
+          <a:prstGeom prst="rect">
+            <a:avLst/>
+          </a:prstGeom>
+          <a:noFill/>
+        </p:spPr>
+        <p:txBody>
+          <a:bodyPr wrap="square" rtlCol="0">
+            <a:spAutoFit/>
+          </a:bodyPr>
+          <a:lstStyle/>
+          <a:p>
+            <a:r>
+              <a:rPr lang="en-SG" dirty="0">
+                <a:solidFill>
+                  <a:srgbClr val="FF0000"/>
+                </a:solidFill>
+              </a:rPr>
+              <a:t>(10,3)</a:t>
+            </a:r>
+          </a:p>
+        </p:txBody>
+      </p:sp>
+      <p:sp>
+        <p:nvSpPr>
+          <p:cNvPr id="136" name="TextBox 135">
+            <a:extLst>
+              <a:ext uri="{FF2B5EF4-FFF2-40B4-BE49-F238E27FC236}">
+                <a16:creationId xmlns:a16="http://schemas.microsoft.com/office/drawing/2014/main" id="{1F41220A-1B67-437C-A369-23F26311A46A}"/>
+              </a:ext>
+            </a:extLst>
+          </p:cNvPr>
+          <p:cNvSpPr txBox="1"/>
+          <p:nvPr/>
+        </p:nvSpPr>
+        <p:spPr>
+          <a:xfrm>
+            <a:off x="3685668" y="2723961"/>
+            <a:ext cx="790575" cy="369332"/>
+          </a:xfrm>
+          <a:prstGeom prst="rect">
+            <a:avLst/>
+          </a:prstGeom>
+          <a:noFill/>
+        </p:spPr>
+        <p:txBody>
+          <a:bodyPr wrap="square" rtlCol="0">
+            <a:spAutoFit/>
+          </a:bodyPr>
+          <a:lstStyle/>
+          <a:p>
+            <a:r>
+              <a:rPr lang="en-SG" dirty="0">
+                <a:solidFill>
+                  <a:srgbClr val="FF0000"/>
+                </a:solidFill>
+              </a:rPr>
+              <a:t>(4,3)</a:t>
+            </a:r>
+          </a:p>
+        </p:txBody>
+      </p:sp>
+      <p:sp>
+        <p:nvSpPr>
+          <p:cNvPr id="84" name="TextBox 83">
+            <a:extLst>
+              <a:ext uri="{FF2B5EF4-FFF2-40B4-BE49-F238E27FC236}">
+                <a16:creationId xmlns:a16="http://schemas.microsoft.com/office/drawing/2014/main" id="{C16F87D3-6866-41E8-9BB9-787AD1BFF74E}"/>
+              </a:ext>
+            </a:extLst>
+          </p:cNvPr>
+          <p:cNvSpPr txBox="1"/>
+          <p:nvPr/>
+        </p:nvSpPr>
+        <p:spPr>
+          <a:xfrm>
+            <a:off x="3673377" y="-34267"/>
+            <a:ext cx="840281" cy="369332"/>
+          </a:xfrm>
+          <a:prstGeom prst="rect">
+            <a:avLst/>
+          </a:prstGeom>
+          <a:noFill/>
+        </p:spPr>
+        <p:txBody>
+          <a:bodyPr wrap="square" rtlCol="0">
+            <a:spAutoFit/>
+          </a:bodyPr>
+          <a:lstStyle/>
+          <a:p>
+            <a:r>
+              <a:rPr lang="en-SG" dirty="0"/>
+              <a:t>Object</a:t>
+            </a:r>
+          </a:p>
+        </p:txBody>
+      </p:sp>
+      <p:sp>
+        <p:nvSpPr>
+          <p:cNvPr id="69" name="TextBox 68">
+            <a:extLst>
+              <a:ext uri="{FF2B5EF4-FFF2-40B4-BE49-F238E27FC236}">
+                <a16:creationId xmlns:a16="http://schemas.microsoft.com/office/drawing/2014/main" id="{F2593D01-B027-4DB6-B10D-9C6ECCF855AF}"/>
+              </a:ext>
+            </a:extLst>
+          </p:cNvPr>
+          <p:cNvSpPr txBox="1"/>
+          <p:nvPr/>
+        </p:nvSpPr>
+        <p:spPr>
+          <a:xfrm>
+            <a:off x="6426075" y="4861970"/>
+            <a:ext cx="790575" cy="369332"/>
+          </a:xfrm>
+          <a:prstGeom prst="rect">
+            <a:avLst/>
+          </a:prstGeom>
+          <a:noFill/>
+        </p:spPr>
+        <p:txBody>
+          <a:bodyPr wrap="square" rtlCol="0">
+            <a:spAutoFit/>
+          </a:bodyPr>
+          <a:lstStyle/>
+          <a:p>
+            <a:r>
+              <a:rPr lang="en-SG" dirty="0"/>
+              <a:t>(10,1)</a:t>
+            </a:r>
+          </a:p>
+        </p:txBody>
+      </p:sp>
+      <p:sp>
+        <p:nvSpPr>
+          <p:cNvPr id="70" name="TextBox 69">
+            <a:extLst>
+              <a:ext uri="{FF2B5EF4-FFF2-40B4-BE49-F238E27FC236}">
+                <a16:creationId xmlns:a16="http://schemas.microsoft.com/office/drawing/2014/main" id="{7E2ED764-65CA-4881-A25C-8A4726F3C1B2}"/>
+              </a:ext>
+            </a:extLst>
+          </p:cNvPr>
+          <p:cNvSpPr txBox="1"/>
+          <p:nvPr/>
+        </p:nvSpPr>
+        <p:spPr>
+          <a:xfrm>
+            <a:off x="6426075" y="2720148"/>
+            <a:ext cx="790575" cy="369332"/>
+          </a:xfrm>
+          <a:prstGeom prst="rect">
+            <a:avLst/>
+          </a:prstGeom>
+          <a:noFill/>
+        </p:spPr>
+        <p:txBody>
+          <a:bodyPr wrap="square" rtlCol="0">
+            <a:spAutoFit/>
+          </a:bodyPr>
+          <a:lstStyle/>
+          <a:p>
+            <a:r>
+              <a:rPr lang="en-SG" dirty="0"/>
+              <a:t>(4,1)</a:t>
+            </a:r>
+          </a:p>
+        </p:txBody>
+      </p:sp>
+      <p:sp>
+        <p:nvSpPr>
+          <p:cNvPr id="71" name="TextBox 70">
+            <a:extLst>
+              <a:ext uri="{FF2B5EF4-FFF2-40B4-BE49-F238E27FC236}">
+                <a16:creationId xmlns:a16="http://schemas.microsoft.com/office/drawing/2014/main" id="{DB7FBCF7-9EFA-4E5C-9401-CE233B40CD6C}"/>
+              </a:ext>
+            </a:extLst>
+          </p:cNvPr>
+          <p:cNvSpPr txBox="1"/>
+          <p:nvPr/>
+        </p:nvSpPr>
+        <p:spPr>
+          <a:xfrm>
+            <a:off x="4944918" y="4119836"/>
+            <a:ext cx="790575" cy="369332"/>
+          </a:xfrm>
+          <a:prstGeom prst="rect">
+            <a:avLst/>
+          </a:prstGeom>
+          <a:noFill/>
+        </p:spPr>
+        <p:txBody>
+          <a:bodyPr wrap="square" rtlCol="0">
+            <a:spAutoFit/>
+          </a:bodyPr>
+          <a:lstStyle/>
+          <a:p>
+            <a:r>
+              <a:rPr lang="en-SG" dirty="0"/>
+              <a:t>(8,2)</a:t>
+            </a:r>
+          </a:p>
+        </p:txBody>
+      </p:sp>
+      <p:sp>
+        <p:nvSpPr>
+          <p:cNvPr id="72" name="TextBox 71">
+            <a:extLst>
+              <a:ext uri="{FF2B5EF4-FFF2-40B4-BE49-F238E27FC236}">
+                <a16:creationId xmlns:a16="http://schemas.microsoft.com/office/drawing/2014/main" id="{2A755202-70A6-4D90-A9E9-0108CC5F9173}"/>
+              </a:ext>
+            </a:extLst>
+          </p:cNvPr>
+          <p:cNvSpPr txBox="1"/>
+          <p:nvPr/>
+        </p:nvSpPr>
+        <p:spPr>
+          <a:xfrm>
+            <a:off x="4964081" y="4861970"/>
+            <a:ext cx="790575" cy="369332"/>
+          </a:xfrm>
+          <a:prstGeom prst="rect">
+            <a:avLst/>
+          </a:prstGeom>
+          <a:noFill/>
+        </p:spPr>
+        <p:txBody>
+          <a:bodyPr wrap="square" rtlCol="0">
+            <a:spAutoFit/>
+          </a:bodyPr>
+          <a:lstStyle/>
+          <a:p>
+            <a:r>
+              <a:rPr lang="en-SG" dirty="0"/>
+              <a:t>(10,2)</a:t>
+            </a:r>
+          </a:p>
+        </p:txBody>
+      </p:sp>
+      <p:sp>
+        <p:nvSpPr>
+          <p:cNvPr id="73" name="TextBox 72">
+            <a:extLst>
+              <a:ext uri="{FF2B5EF4-FFF2-40B4-BE49-F238E27FC236}">
+                <a16:creationId xmlns:a16="http://schemas.microsoft.com/office/drawing/2014/main" id="{5D7A67A1-F061-4276-8F73-D69327C8803F}"/>
+              </a:ext>
+            </a:extLst>
+          </p:cNvPr>
+          <p:cNvSpPr txBox="1"/>
+          <p:nvPr/>
+        </p:nvSpPr>
+        <p:spPr>
+          <a:xfrm>
+            <a:off x="4964081" y="2723487"/>
+            <a:ext cx="790575" cy="369332"/>
+          </a:xfrm>
+          <a:prstGeom prst="rect">
+            <a:avLst/>
+          </a:prstGeom>
+          <a:noFill/>
+        </p:spPr>
+        <p:txBody>
+          <a:bodyPr wrap="square" rtlCol="0">
+            <a:spAutoFit/>
+          </a:bodyPr>
+          <a:lstStyle/>
+          <a:p>
+            <a:r>
+              <a:rPr lang="en-SG" dirty="0"/>
+              <a:t>(4,2)</a:t>
+            </a:r>
+          </a:p>
+        </p:txBody>
+      </p:sp>
+      <p:sp>
+        <p:nvSpPr>
+          <p:cNvPr id="74" name="TextBox 73">
+            <a:extLst>
+              <a:ext uri="{FF2B5EF4-FFF2-40B4-BE49-F238E27FC236}">
+                <a16:creationId xmlns:a16="http://schemas.microsoft.com/office/drawing/2014/main" id="{7FE38FB7-BFDE-4A97-BA01-C469E77D73EF}"/>
+              </a:ext>
+            </a:extLst>
+          </p:cNvPr>
+          <p:cNvSpPr txBox="1"/>
+          <p:nvPr/>
+        </p:nvSpPr>
+        <p:spPr>
+          <a:xfrm>
+            <a:off x="4958845" y="1953812"/>
+            <a:ext cx="790575" cy="369332"/>
+          </a:xfrm>
+          <a:prstGeom prst="rect">
+            <a:avLst/>
+          </a:prstGeom>
+          <a:noFill/>
+        </p:spPr>
+        <p:txBody>
+          <a:bodyPr wrap="square" rtlCol="0">
+            <a:spAutoFit/>
+          </a:bodyPr>
+          <a:lstStyle/>
+          <a:p>
+            <a:r>
+              <a:rPr lang="en-SG" dirty="0"/>
+              <a:t>(2,2)</a:t>
+            </a:r>
+          </a:p>
+        </p:txBody>
+      </p:sp>
+      <p:sp>
+        <p:nvSpPr>
+          <p:cNvPr id="76" name="TextBox 75">
+            <a:extLst>
+              <a:ext uri="{FF2B5EF4-FFF2-40B4-BE49-F238E27FC236}">
+                <a16:creationId xmlns:a16="http://schemas.microsoft.com/office/drawing/2014/main" id="{95D07204-15CC-483A-B76A-5C149529309F}"/>
+              </a:ext>
+            </a:extLst>
+          </p:cNvPr>
+          <p:cNvSpPr txBox="1"/>
+          <p:nvPr/>
+        </p:nvSpPr>
+        <p:spPr>
+          <a:xfrm>
+            <a:off x="4964080" y="1217041"/>
+            <a:ext cx="790575" cy="369332"/>
+          </a:xfrm>
+          <a:prstGeom prst="rect">
+            <a:avLst/>
+          </a:prstGeom>
+          <a:noFill/>
+        </p:spPr>
+        <p:txBody>
+          <a:bodyPr wrap="square" rtlCol="0">
+            <a:spAutoFit/>
+          </a:bodyPr>
+          <a:lstStyle/>
+          <a:p>
+            <a:r>
+              <a:rPr lang="en-SG" dirty="0">
+                <a:solidFill>
+                  <a:srgbClr val="FF0000"/>
+                </a:solidFill>
+              </a:rPr>
+              <a:t>(0,2)</a:t>
+            </a:r>
+          </a:p>
+        </p:txBody>
+      </p:sp>
+      <p:cxnSp>
+        <p:nvCxnSpPr>
+          <p:cNvPr id="6" name="Straight Arrow Connector 5">
+            <a:extLst>
+              <a:ext uri="{FF2B5EF4-FFF2-40B4-BE49-F238E27FC236}">
+                <a16:creationId xmlns:a16="http://schemas.microsoft.com/office/drawing/2014/main" id="{FC1ACB1C-0ADC-43CA-833A-614A36C6B401}"/>
+              </a:ext>
+            </a:extLst>
+          </p:cNvPr>
+          <p:cNvCxnSpPr>
+            <a:cxnSpLocks/>
+            <a:endCxn id="115" idx="3"/>
+          </p:cNvCxnSpPr>
+          <p:nvPr/>
+        </p:nvCxnSpPr>
+        <p:spPr>
+          <a:xfrm flipH="1">
+            <a:off x="7193618" y="2138478"/>
+            <a:ext cx="658536" cy="0"/>
+          </a:xfrm>
+          <a:prstGeom prst="straightConnector1">
+            <a:avLst/>
+          </a:prstGeom>
+          <a:ln>
+            <a:tailEnd type="triangle"/>
+          </a:ln>
+        </p:spPr>
+        <p:style>
+          <a:lnRef idx="1">
+            <a:schemeClr val="accent1"/>
+          </a:lnRef>
+          <a:fillRef idx="0">
+            <a:schemeClr val="accent1"/>
+          </a:fillRef>
+          <a:effectRef idx="0">
+            <a:schemeClr val="accent1"/>
+          </a:effectRef>
+          <a:fontRef idx="minor">
+            <a:schemeClr val="tx1"/>
+          </a:fontRef>
+        </p:style>
+      </p:cxnSp>
+      <p:cxnSp>
+        <p:nvCxnSpPr>
+          <p:cNvPr id="23" name="Straight Arrow Connector 22">
+            <a:extLst>
+              <a:ext uri="{FF2B5EF4-FFF2-40B4-BE49-F238E27FC236}">
+                <a16:creationId xmlns:a16="http://schemas.microsoft.com/office/drawing/2014/main" id="{8DC24E38-EAE2-4812-A26F-59688F1AB6CB}"/>
+              </a:ext>
+            </a:extLst>
+          </p:cNvPr>
+          <p:cNvCxnSpPr>
+            <a:cxnSpLocks/>
+            <a:stCxn id="110" idx="1"/>
+            <a:endCxn id="17" idx="3"/>
+          </p:cNvCxnSpPr>
+          <p:nvPr/>
+        </p:nvCxnSpPr>
+        <p:spPr>
+          <a:xfrm flipH="1">
+            <a:off x="7172350" y="3609891"/>
+            <a:ext cx="679805" cy="828"/>
+          </a:xfrm>
+          <a:prstGeom prst="straightConnector1">
+            <a:avLst/>
+          </a:prstGeom>
+          <a:ln>
+            <a:tailEnd type="triangle"/>
+          </a:ln>
+        </p:spPr>
+        <p:style>
+          <a:lnRef idx="1">
+            <a:schemeClr val="accent1"/>
+          </a:lnRef>
+          <a:fillRef idx="0">
+            <a:schemeClr val="accent1"/>
+          </a:fillRef>
+          <a:effectRef idx="0">
+            <a:schemeClr val="accent1"/>
+          </a:effectRef>
+          <a:fontRef idx="minor">
+            <a:schemeClr val="tx1"/>
+          </a:fontRef>
+        </p:style>
+      </p:cxnSp>
+      <p:cxnSp>
+        <p:nvCxnSpPr>
+          <p:cNvPr id="26" name="Straight Arrow Connector 25">
+            <a:extLst>
+              <a:ext uri="{FF2B5EF4-FFF2-40B4-BE49-F238E27FC236}">
+                <a16:creationId xmlns:a16="http://schemas.microsoft.com/office/drawing/2014/main" id="{B67B3FC9-4088-4859-8982-144A7F6CA488}"/>
+              </a:ext>
+            </a:extLst>
+          </p:cNvPr>
+          <p:cNvCxnSpPr>
+            <a:stCxn id="20" idx="1"/>
+            <a:endCxn id="69" idx="3"/>
+          </p:cNvCxnSpPr>
+          <p:nvPr/>
+        </p:nvCxnSpPr>
+        <p:spPr>
+          <a:xfrm flipH="1">
+            <a:off x="7216650" y="5046636"/>
+            <a:ext cx="614873" cy="0"/>
+          </a:xfrm>
+          <a:prstGeom prst="straightConnector1">
+            <a:avLst/>
+          </a:prstGeom>
+          <a:ln>
+            <a:tailEnd type="triangle"/>
+          </a:ln>
+        </p:spPr>
+        <p:style>
+          <a:lnRef idx="1">
+            <a:schemeClr val="accent1"/>
+          </a:lnRef>
+          <a:fillRef idx="0">
+            <a:schemeClr val="accent1"/>
+          </a:fillRef>
+          <a:effectRef idx="0">
+            <a:schemeClr val="accent1"/>
+          </a:effectRef>
+          <a:fontRef idx="minor">
+            <a:schemeClr val="tx1"/>
+          </a:fontRef>
+        </p:style>
+      </p:cxnSp>
+      <p:cxnSp>
+        <p:nvCxnSpPr>
+          <p:cNvPr id="33" name="Straight Arrow Connector 32">
+            <a:extLst>
+              <a:ext uri="{FF2B5EF4-FFF2-40B4-BE49-F238E27FC236}">
+                <a16:creationId xmlns:a16="http://schemas.microsoft.com/office/drawing/2014/main" id="{CF232363-F706-4017-8C30-45643BB1D895}"/>
+              </a:ext>
+            </a:extLst>
+          </p:cNvPr>
+          <p:cNvCxnSpPr>
+            <a:stCxn id="8" idx="1"/>
+            <a:endCxn id="7" idx="3"/>
+          </p:cNvCxnSpPr>
+          <p:nvPr/>
+        </p:nvCxnSpPr>
+        <p:spPr>
+          <a:xfrm flipH="1">
+            <a:off x="7172350" y="6608361"/>
+            <a:ext cx="679806" cy="0"/>
+          </a:xfrm>
+          <a:prstGeom prst="straightConnector1">
+            <a:avLst/>
+          </a:prstGeom>
+          <a:ln>
+            <a:tailEnd type="triangle"/>
+          </a:ln>
+        </p:spPr>
+        <p:style>
+          <a:lnRef idx="1">
+            <a:schemeClr val="accent1"/>
+          </a:lnRef>
+          <a:fillRef idx="0">
+            <a:schemeClr val="accent1"/>
+          </a:fillRef>
+          <a:effectRef idx="0">
+            <a:schemeClr val="accent1"/>
+          </a:effectRef>
+          <a:fontRef idx="minor">
+            <a:schemeClr val="tx1"/>
+          </a:fontRef>
+        </p:style>
+      </p:cxnSp>
+      <p:cxnSp>
+        <p:nvCxnSpPr>
+          <p:cNvPr id="36" name="Straight Arrow Connector 35">
+            <a:extLst>
+              <a:ext uri="{FF2B5EF4-FFF2-40B4-BE49-F238E27FC236}">
+                <a16:creationId xmlns:a16="http://schemas.microsoft.com/office/drawing/2014/main" id="{141C1D62-A193-4713-83C2-5FCD7CE48E55}"/>
+              </a:ext>
+            </a:extLst>
+          </p:cNvPr>
+          <p:cNvCxnSpPr>
+            <a:stCxn id="7" idx="1"/>
+            <a:endCxn id="4" idx="3"/>
+          </p:cNvCxnSpPr>
+          <p:nvPr/>
+        </p:nvCxnSpPr>
+        <p:spPr>
+          <a:xfrm flipH="1" flipV="1">
+            <a:off x="5735493" y="6604530"/>
+            <a:ext cx="646282" cy="3831"/>
+          </a:xfrm>
+          <a:prstGeom prst="straightConnector1">
+            <a:avLst/>
+          </a:prstGeom>
+          <a:ln>
+            <a:tailEnd type="triangle"/>
+          </a:ln>
+        </p:spPr>
+        <p:style>
+          <a:lnRef idx="1">
+            <a:schemeClr val="accent1"/>
+          </a:lnRef>
+          <a:fillRef idx="0">
+            <a:schemeClr val="accent1"/>
+          </a:fillRef>
+          <a:effectRef idx="0">
+            <a:schemeClr val="accent1"/>
+          </a:effectRef>
+          <a:fontRef idx="minor">
+            <a:schemeClr val="tx1"/>
+          </a:fontRef>
+        </p:style>
+      </p:cxnSp>
+      <p:cxnSp>
+        <p:nvCxnSpPr>
+          <p:cNvPr id="38" name="Straight Arrow Connector 37">
+            <a:extLst>
+              <a:ext uri="{FF2B5EF4-FFF2-40B4-BE49-F238E27FC236}">
+                <a16:creationId xmlns:a16="http://schemas.microsoft.com/office/drawing/2014/main" id="{5D97F563-FC17-4A49-BF98-473C4DCE107C}"/>
+              </a:ext>
+            </a:extLst>
+          </p:cNvPr>
+          <p:cNvCxnSpPr>
+            <a:stCxn id="4" idx="1"/>
+            <a:endCxn id="9" idx="3"/>
+          </p:cNvCxnSpPr>
+          <p:nvPr/>
+        </p:nvCxnSpPr>
+        <p:spPr>
+          <a:xfrm flipH="1">
+            <a:off x="4483444" y="6604530"/>
+            <a:ext cx="461474" cy="0"/>
+          </a:xfrm>
+          <a:prstGeom prst="straightConnector1">
+            <a:avLst/>
+          </a:prstGeom>
+          <a:ln>
+            <a:tailEnd type="triangle"/>
+          </a:ln>
+        </p:spPr>
+        <p:style>
+          <a:lnRef idx="1">
+            <a:schemeClr val="accent1"/>
+          </a:lnRef>
+          <a:fillRef idx="0">
+            <a:schemeClr val="accent1"/>
+          </a:fillRef>
+          <a:effectRef idx="0">
+            <a:schemeClr val="accent1"/>
+          </a:effectRef>
+          <a:fontRef idx="minor">
+            <a:schemeClr val="tx1"/>
+          </a:fontRef>
+        </p:style>
+      </p:cxnSp>
+      <p:cxnSp>
+        <p:nvCxnSpPr>
+          <p:cNvPr id="42" name="Straight Arrow Connector 41">
+            <a:extLst>
+              <a:ext uri="{FF2B5EF4-FFF2-40B4-BE49-F238E27FC236}">
+                <a16:creationId xmlns:a16="http://schemas.microsoft.com/office/drawing/2014/main" id="{14B1B956-445C-4A42-8428-E21277D0819C}"/>
+              </a:ext>
+            </a:extLst>
+          </p:cNvPr>
+          <p:cNvCxnSpPr>
+            <a:stCxn id="69" idx="1"/>
+            <a:endCxn id="72" idx="3"/>
+          </p:cNvCxnSpPr>
+          <p:nvPr/>
+        </p:nvCxnSpPr>
+        <p:spPr>
+          <a:xfrm flipH="1">
+            <a:off x="5754656" y="5046636"/>
+            <a:ext cx="671419" cy="0"/>
+          </a:xfrm>
+          <a:prstGeom prst="straightConnector1">
+            <a:avLst/>
+          </a:prstGeom>
+          <a:ln>
+            <a:tailEnd type="triangle"/>
+          </a:ln>
+        </p:spPr>
+        <p:style>
+          <a:lnRef idx="1">
+            <a:schemeClr val="accent1"/>
+          </a:lnRef>
+          <a:fillRef idx="0">
+            <a:schemeClr val="accent1"/>
+          </a:fillRef>
+          <a:effectRef idx="0">
+            <a:schemeClr val="accent1"/>
+          </a:effectRef>
+          <a:fontRef idx="minor">
+            <a:schemeClr val="tx1"/>
+          </a:fontRef>
+        </p:style>
+      </p:cxnSp>
+      <p:cxnSp>
+        <p:nvCxnSpPr>
+          <p:cNvPr id="46" name="Straight Arrow Connector 45">
+            <a:extLst>
+              <a:ext uri="{FF2B5EF4-FFF2-40B4-BE49-F238E27FC236}">
+                <a16:creationId xmlns:a16="http://schemas.microsoft.com/office/drawing/2014/main" id="{93996217-2B09-43D8-AFE1-335E7F584CA0}"/>
+              </a:ext>
+            </a:extLst>
+          </p:cNvPr>
+          <p:cNvCxnSpPr>
+            <a:stCxn id="72" idx="1"/>
+            <a:endCxn id="135" idx="3"/>
+          </p:cNvCxnSpPr>
+          <p:nvPr/>
+        </p:nvCxnSpPr>
+        <p:spPr>
+          <a:xfrm flipH="1">
+            <a:off x="4476243" y="5046636"/>
+            <a:ext cx="487838" cy="0"/>
+          </a:xfrm>
+          <a:prstGeom prst="straightConnector1">
+            <a:avLst/>
+          </a:prstGeom>
+          <a:ln>
+            <a:tailEnd type="triangle"/>
+          </a:ln>
+        </p:spPr>
+        <p:style>
+          <a:lnRef idx="1">
+            <a:schemeClr val="accent1"/>
+          </a:lnRef>
+          <a:fillRef idx="0">
+            <a:schemeClr val="accent1"/>
+          </a:fillRef>
+          <a:effectRef idx="0">
+            <a:schemeClr val="accent1"/>
+          </a:effectRef>
+          <a:fontRef idx="minor">
+            <a:schemeClr val="tx1"/>
+          </a:fontRef>
+        </p:style>
+      </p:cxnSp>
+      <p:cxnSp>
+        <p:nvCxnSpPr>
+          <p:cNvPr id="49" name="Straight Arrow Connector 48">
+            <a:extLst>
+              <a:ext uri="{FF2B5EF4-FFF2-40B4-BE49-F238E27FC236}">
+                <a16:creationId xmlns:a16="http://schemas.microsoft.com/office/drawing/2014/main" id="{23014F04-268D-4649-BCC3-9606E11CFA1A}"/>
+              </a:ext>
+            </a:extLst>
+          </p:cNvPr>
+          <p:cNvCxnSpPr>
+            <a:stCxn id="18" idx="1"/>
+            <a:endCxn id="71" idx="3"/>
+          </p:cNvCxnSpPr>
+          <p:nvPr/>
+        </p:nvCxnSpPr>
+        <p:spPr>
+          <a:xfrm flipH="1">
+            <a:off x="5735493" y="4304502"/>
+            <a:ext cx="667550" cy="0"/>
+          </a:xfrm>
+          <a:prstGeom prst="straightConnector1">
+            <a:avLst/>
+          </a:prstGeom>
+          <a:ln>
+            <a:tailEnd type="triangle"/>
+          </a:ln>
+        </p:spPr>
+        <p:style>
+          <a:lnRef idx="1">
+            <a:schemeClr val="accent1"/>
+          </a:lnRef>
+          <a:fillRef idx="0">
+            <a:schemeClr val="accent1"/>
+          </a:fillRef>
+          <a:effectRef idx="0">
+            <a:schemeClr val="accent1"/>
+          </a:effectRef>
+          <a:fontRef idx="minor">
+            <a:schemeClr val="tx1"/>
+          </a:fontRef>
+        </p:style>
+      </p:cxnSp>
+      <p:cxnSp>
+        <p:nvCxnSpPr>
+          <p:cNvPr id="51" name="Straight Arrow Connector 50">
+            <a:extLst>
+              <a:ext uri="{FF2B5EF4-FFF2-40B4-BE49-F238E27FC236}">
+                <a16:creationId xmlns:a16="http://schemas.microsoft.com/office/drawing/2014/main" id="{A6471DC6-A61B-4A2C-A089-F95A8F6DF403}"/>
+              </a:ext>
+            </a:extLst>
+          </p:cNvPr>
+          <p:cNvCxnSpPr>
+            <a:stCxn id="71" idx="1"/>
+            <a:endCxn id="105" idx="3"/>
+          </p:cNvCxnSpPr>
+          <p:nvPr/>
+        </p:nvCxnSpPr>
+        <p:spPr>
+          <a:xfrm flipH="1">
+            <a:off x="4483446" y="4304502"/>
+            <a:ext cx="461472" cy="0"/>
+          </a:xfrm>
+          <a:prstGeom prst="straightConnector1">
+            <a:avLst/>
+          </a:prstGeom>
+          <a:ln>
+            <a:tailEnd type="triangle"/>
+          </a:ln>
+        </p:spPr>
+        <p:style>
+          <a:lnRef idx="1">
+            <a:schemeClr val="accent1"/>
+          </a:lnRef>
+          <a:fillRef idx="0">
+            <a:schemeClr val="accent1"/>
+          </a:fillRef>
+          <a:effectRef idx="0">
+            <a:schemeClr val="accent1"/>
+          </a:effectRef>
+          <a:fontRef idx="minor">
+            <a:schemeClr val="tx1"/>
+          </a:fontRef>
+        </p:style>
+      </p:cxnSp>
+      <p:cxnSp>
+        <p:nvCxnSpPr>
+          <p:cNvPr id="57" name="Straight Arrow Connector 56">
+            <a:extLst>
+              <a:ext uri="{FF2B5EF4-FFF2-40B4-BE49-F238E27FC236}">
+                <a16:creationId xmlns:a16="http://schemas.microsoft.com/office/drawing/2014/main" id="{2B7F5610-B088-4250-A539-D3FCE8575DA9}"/>
+              </a:ext>
+            </a:extLst>
+          </p:cNvPr>
+          <p:cNvCxnSpPr>
+            <a:stCxn id="17" idx="1"/>
+            <a:endCxn id="16" idx="3"/>
+          </p:cNvCxnSpPr>
+          <p:nvPr/>
+        </p:nvCxnSpPr>
+        <p:spPr>
+          <a:xfrm flipH="1" flipV="1">
+            <a:off x="5735493" y="3609891"/>
+            <a:ext cx="679035" cy="828"/>
+          </a:xfrm>
+          <a:prstGeom prst="straightConnector1">
+            <a:avLst/>
+          </a:prstGeom>
+          <a:ln>
+            <a:tailEnd type="triangle"/>
+          </a:ln>
+        </p:spPr>
+        <p:style>
+          <a:lnRef idx="1">
+            <a:schemeClr val="accent1"/>
+          </a:lnRef>
+          <a:fillRef idx="0">
+            <a:schemeClr val="accent1"/>
+          </a:fillRef>
+          <a:effectRef idx="0">
+            <a:schemeClr val="accent1"/>
+          </a:effectRef>
+          <a:fontRef idx="minor">
+            <a:schemeClr val="tx1"/>
+          </a:fontRef>
+        </p:style>
+      </p:cxnSp>
+      <p:cxnSp>
+        <p:nvCxnSpPr>
+          <p:cNvPr id="60" name="Straight Arrow Connector 59">
+            <a:extLst>
+              <a:ext uri="{FF2B5EF4-FFF2-40B4-BE49-F238E27FC236}">
+                <a16:creationId xmlns:a16="http://schemas.microsoft.com/office/drawing/2014/main" id="{1652D6EC-8635-4379-B7FD-C2BD839DF3ED}"/>
+              </a:ext>
+            </a:extLst>
+          </p:cNvPr>
+          <p:cNvCxnSpPr>
+            <a:stCxn id="70" idx="1"/>
+            <a:endCxn id="73" idx="3"/>
+          </p:cNvCxnSpPr>
+          <p:nvPr/>
+        </p:nvCxnSpPr>
+        <p:spPr>
+          <a:xfrm flipH="1">
+            <a:off x="5754656" y="2904814"/>
+            <a:ext cx="671419" cy="3339"/>
+          </a:xfrm>
+          <a:prstGeom prst="straightConnector1">
+            <a:avLst/>
+          </a:prstGeom>
+          <a:ln>
+            <a:tailEnd type="triangle"/>
+          </a:ln>
+        </p:spPr>
+        <p:style>
+          <a:lnRef idx="1">
+            <a:schemeClr val="accent1"/>
+          </a:lnRef>
+          <a:fillRef idx="0">
+            <a:schemeClr val="accent1"/>
+          </a:fillRef>
+          <a:effectRef idx="0">
+            <a:schemeClr val="accent1"/>
+          </a:effectRef>
+          <a:fontRef idx="minor">
+            <a:schemeClr val="tx1"/>
+          </a:fontRef>
+        </p:style>
+      </p:cxnSp>
+      <p:cxnSp>
+        <p:nvCxnSpPr>
+          <p:cNvPr id="62" name="Straight Arrow Connector 61">
+            <a:extLst>
+              <a:ext uri="{FF2B5EF4-FFF2-40B4-BE49-F238E27FC236}">
+                <a16:creationId xmlns:a16="http://schemas.microsoft.com/office/drawing/2014/main" id="{256F32CC-164C-4F44-9AEE-F87D2FC56186}"/>
+              </a:ext>
+            </a:extLst>
+          </p:cNvPr>
+          <p:cNvCxnSpPr>
+            <a:stCxn id="73" idx="1"/>
+            <a:endCxn id="136" idx="3"/>
+          </p:cNvCxnSpPr>
+          <p:nvPr/>
+        </p:nvCxnSpPr>
+        <p:spPr>
+          <a:xfrm flipH="1">
+            <a:off x="4476243" y="2908153"/>
+            <a:ext cx="487838" cy="474"/>
+          </a:xfrm>
+          <a:prstGeom prst="straightConnector1">
+            <a:avLst/>
+          </a:prstGeom>
+          <a:ln>
+            <a:tailEnd type="triangle"/>
+          </a:ln>
+        </p:spPr>
+        <p:style>
+          <a:lnRef idx="1">
+            <a:schemeClr val="accent1"/>
+          </a:lnRef>
+          <a:fillRef idx="0">
+            <a:schemeClr val="accent1"/>
+          </a:fillRef>
+          <a:effectRef idx="0">
+            <a:schemeClr val="accent1"/>
+          </a:effectRef>
+          <a:fontRef idx="minor">
+            <a:schemeClr val="tx1"/>
+          </a:fontRef>
+        </p:style>
+      </p:cxnSp>
+      <p:cxnSp>
+        <p:nvCxnSpPr>
+          <p:cNvPr id="66" name="Straight Arrow Connector 65">
+            <a:extLst>
+              <a:ext uri="{FF2B5EF4-FFF2-40B4-BE49-F238E27FC236}">
+                <a16:creationId xmlns:a16="http://schemas.microsoft.com/office/drawing/2014/main" id="{8A40AD03-E765-46B8-80BD-57D551CA82CF}"/>
+              </a:ext>
+            </a:extLst>
+          </p:cNvPr>
+          <p:cNvCxnSpPr>
+            <a:stCxn id="16" idx="1"/>
+            <a:endCxn id="156" idx="3"/>
+          </p:cNvCxnSpPr>
+          <p:nvPr/>
+        </p:nvCxnSpPr>
+        <p:spPr>
+          <a:xfrm flipH="1">
+            <a:off x="4483444" y="3609891"/>
+            <a:ext cx="461474" cy="4425"/>
+          </a:xfrm>
+          <a:prstGeom prst="straightConnector1">
+            <a:avLst/>
+          </a:prstGeom>
+          <a:ln>
+            <a:tailEnd type="triangle"/>
+          </a:ln>
+        </p:spPr>
+        <p:style>
+          <a:lnRef idx="1">
+            <a:schemeClr val="accent1"/>
+          </a:lnRef>
+          <a:fillRef idx="0">
+            <a:schemeClr val="accent1"/>
+          </a:fillRef>
+          <a:effectRef idx="0">
+            <a:schemeClr val="accent1"/>
+          </a:effectRef>
+          <a:fontRef idx="minor">
+            <a:schemeClr val="tx1"/>
+          </a:fontRef>
+        </p:style>
+      </p:cxnSp>
+      <p:cxnSp>
+        <p:nvCxnSpPr>
+          <p:cNvPr id="78" name="Straight Arrow Connector 77">
+            <a:extLst>
+              <a:ext uri="{FF2B5EF4-FFF2-40B4-BE49-F238E27FC236}">
+                <a16:creationId xmlns:a16="http://schemas.microsoft.com/office/drawing/2014/main" id="{2D832C2F-FA6C-4016-A735-2E54A9321C28}"/>
+              </a:ext>
+            </a:extLst>
+          </p:cNvPr>
+          <p:cNvCxnSpPr>
+            <a:stCxn id="115" idx="1"/>
+            <a:endCxn id="74" idx="3"/>
+          </p:cNvCxnSpPr>
+          <p:nvPr/>
+        </p:nvCxnSpPr>
+        <p:spPr>
+          <a:xfrm flipH="1">
+            <a:off x="5749420" y="2138478"/>
+            <a:ext cx="665108" cy="0"/>
+          </a:xfrm>
+          <a:prstGeom prst="straightConnector1">
+            <a:avLst/>
+          </a:prstGeom>
+          <a:ln>
+            <a:tailEnd type="triangle"/>
+          </a:ln>
+        </p:spPr>
+        <p:style>
+          <a:lnRef idx="1">
+            <a:schemeClr val="accent1"/>
+          </a:lnRef>
+          <a:fillRef idx="0">
+            <a:schemeClr val="accent1"/>
+          </a:fillRef>
+          <a:effectRef idx="0">
+            <a:schemeClr val="accent1"/>
+          </a:effectRef>
+          <a:fontRef idx="minor">
+            <a:schemeClr val="tx1"/>
+          </a:fontRef>
+        </p:style>
+      </p:cxnSp>
+      <p:cxnSp>
+        <p:nvCxnSpPr>
+          <p:cNvPr id="81" name="Straight Arrow Connector 80">
+            <a:extLst>
+              <a:ext uri="{FF2B5EF4-FFF2-40B4-BE49-F238E27FC236}">
+                <a16:creationId xmlns:a16="http://schemas.microsoft.com/office/drawing/2014/main" id="{02C4C2AE-305B-4180-A91E-9E0A4CE11132}"/>
+              </a:ext>
+            </a:extLst>
+          </p:cNvPr>
+          <p:cNvCxnSpPr>
+            <a:stCxn id="74" idx="1"/>
+            <a:endCxn id="106" idx="3"/>
+          </p:cNvCxnSpPr>
+          <p:nvPr/>
+        </p:nvCxnSpPr>
+        <p:spPr>
+          <a:xfrm flipH="1">
+            <a:off x="4483446" y="2138478"/>
+            <a:ext cx="475399" cy="2187"/>
+          </a:xfrm>
+          <a:prstGeom prst="straightConnector1">
+            <a:avLst/>
+          </a:prstGeom>
+          <a:ln>
+            <a:tailEnd type="triangle"/>
+          </a:ln>
+        </p:spPr>
+        <p:style>
+          <a:lnRef idx="1">
+            <a:schemeClr val="accent1"/>
+          </a:lnRef>
+          <a:fillRef idx="0">
+            <a:schemeClr val="accent1"/>
+          </a:fillRef>
+          <a:effectRef idx="0">
+            <a:schemeClr val="accent1"/>
+          </a:effectRef>
+          <a:fontRef idx="minor">
+            <a:schemeClr val="tx1"/>
+          </a:fontRef>
+        </p:style>
+      </p:cxnSp>
+      <p:cxnSp>
+        <p:nvCxnSpPr>
+          <p:cNvPr id="85" name="Straight Arrow Connector 84">
+            <a:extLst>
+              <a:ext uri="{FF2B5EF4-FFF2-40B4-BE49-F238E27FC236}">
+                <a16:creationId xmlns:a16="http://schemas.microsoft.com/office/drawing/2014/main" id="{85C9F6AF-1695-4653-9464-6725A0348202}"/>
+              </a:ext>
+            </a:extLst>
+          </p:cNvPr>
+          <p:cNvCxnSpPr>
+            <a:stCxn id="45" idx="1"/>
+            <a:endCxn id="76" idx="3"/>
+          </p:cNvCxnSpPr>
+          <p:nvPr/>
+        </p:nvCxnSpPr>
+        <p:spPr>
+          <a:xfrm flipH="1" flipV="1">
+            <a:off x="5754655" y="1401707"/>
+            <a:ext cx="648388" cy="3831"/>
+          </a:xfrm>
+          <a:prstGeom prst="straightConnector1">
+            <a:avLst/>
+          </a:prstGeom>
+          <a:ln>
+            <a:tailEnd type="triangle"/>
+          </a:ln>
+        </p:spPr>
+        <p:style>
+          <a:lnRef idx="1">
+            <a:schemeClr val="accent1"/>
+          </a:lnRef>
+          <a:fillRef idx="0">
+            <a:schemeClr val="accent1"/>
+          </a:fillRef>
+          <a:effectRef idx="0">
+            <a:schemeClr val="accent1"/>
+          </a:effectRef>
+          <a:fontRef idx="minor">
+            <a:schemeClr val="tx1"/>
+          </a:fontRef>
+        </p:style>
+      </p:cxnSp>
+      <p:cxnSp>
+        <p:nvCxnSpPr>
+          <p:cNvPr id="90" name="Connector: Elbow 89">
+            <a:extLst>
+              <a:ext uri="{FF2B5EF4-FFF2-40B4-BE49-F238E27FC236}">
+                <a16:creationId xmlns:a16="http://schemas.microsoft.com/office/drawing/2014/main" id="{48896FE6-F758-4D8F-A54F-70CCA4B73E66}"/>
+              </a:ext>
+            </a:extLst>
+          </p:cNvPr>
+          <p:cNvCxnSpPr>
+            <a:stCxn id="8" idx="3"/>
+            <a:endCxn id="20" idx="3"/>
+          </p:cNvCxnSpPr>
+          <p:nvPr/>
+        </p:nvCxnSpPr>
+        <p:spPr>
+          <a:xfrm flipH="1" flipV="1">
+            <a:off x="8622098" y="5046636"/>
+            <a:ext cx="20633" cy="1561725"/>
+          </a:xfrm>
+          <a:prstGeom prst="bentConnector3">
+            <a:avLst>
+              <a:gd name="adj1" fmla="val -763723"/>
+            </a:avLst>
+          </a:prstGeom>
+          <a:ln>
+            <a:tailEnd type="triangle"/>
+          </a:ln>
+        </p:spPr>
+        <p:style>
+          <a:lnRef idx="1">
+            <a:schemeClr val="accent4"/>
+          </a:lnRef>
+          <a:fillRef idx="0">
+            <a:schemeClr val="accent4"/>
+          </a:fillRef>
+          <a:effectRef idx="0">
+            <a:schemeClr val="accent4"/>
+          </a:effectRef>
+          <a:fontRef idx="minor">
+            <a:schemeClr val="tx1"/>
+          </a:fontRef>
+        </p:style>
+      </p:cxnSp>
+      <p:sp>
+        <p:nvSpPr>
+          <p:cNvPr id="157" name="TextBox 156">
+            <a:extLst>
+              <a:ext uri="{FF2B5EF4-FFF2-40B4-BE49-F238E27FC236}">
+                <a16:creationId xmlns:a16="http://schemas.microsoft.com/office/drawing/2014/main" id="{E8629BEE-4B7A-4C00-8DF4-A93A6243593E}"/>
+              </a:ext>
+            </a:extLst>
+          </p:cNvPr>
+          <p:cNvSpPr txBox="1"/>
+          <p:nvPr/>
+        </p:nvSpPr>
+        <p:spPr>
+          <a:xfrm>
+            <a:off x="7852154" y="1953812"/>
+            <a:ext cx="790575" cy="369332"/>
+          </a:xfrm>
+          <a:prstGeom prst="rect">
+            <a:avLst/>
+          </a:prstGeom>
+          <a:noFill/>
+        </p:spPr>
+        <p:txBody>
+          <a:bodyPr wrap="square" rtlCol="0">
+            <a:spAutoFit/>
+          </a:bodyPr>
+          <a:lstStyle/>
+          <a:p>
+            <a:r>
+              <a:rPr lang="en-SG" dirty="0"/>
+              <a:t>(2,0)</a:t>
+            </a:r>
+          </a:p>
+        </p:txBody>
+      </p:sp>
+      <p:cxnSp>
+        <p:nvCxnSpPr>
+          <p:cNvPr id="168" name="Connector: Elbow 167">
+            <a:extLst>
+              <a:ext uri="{FF2B5EF4-FFF2-40B4-BE49-F238E27FC236}">
+                <a16:creationId xmlns:a16="http://schemas.microsoft.com/office/drawing/2014/main" id="{EEE79C37-0C34-406C-8BDD-B12535A94BA6}"/>
+              </a:ext>
+            </a:extLst>
+          </p:cNvPr>
+          <p:cNvCxnSpPr/>
+          <p:nvPr/>
+        </p:nvCxnSpPr>
+        <p:spPr>
+          <a:xfrm flipV="1">
+            <a:off x="8622098" y="3609891"/>
+            <a:ext cx="20632" cy="1436745"/>
+          </a:xfrm>
+          <a:prstGeom prst="bentConnector3">
+            <a:avLst>
+              <a:gd name="adj1" fmla="val 1638275"/>
+            </a:avLst>
+          </a:prstGeom>
+          <a:ln>
+            <a:tailEnd type="triangle"/>
+          </a:ln>
+        </p:spPr>
+        <p:style>
+          <a:lnRef idx="1">
+            <a:schemeClr val="accent4"/>
+          </a:lnRef>
+          <a:fillRef idx="0">
+            <a:schemeClr val="accent4"/>
+          </a:fillRef>
+          <a:effectRef idx="0">
+            <a:schemeClr val="accent4"/>
+          </a:effectRef>
+          <a:fontRef idx="minor">
+            <a:schemeClr val="tx1"/>
+          </a:fontRef>
+        </p:style>
+      </p:cxnSp>
+      <p:cxnSp>
+        <p:nvCxnSpPr>
+          <p:cNvPr id="169" name="Connector: Elbow 168">
+            <a:extLst>
+              <a:ext uri="{FF2B5EF4-FFF2-40B4-BE49-F238E27FC236}">
+                <a16:creationId xmlns:a16="http://schemas.microsoft.com/office/drawing/2014/main" id="{C9C7D606-81ED-4461-9E8B-9CAAAD84FE08}"/>
+              </a:ext>
+            </a:extLst>
+          </p:cNvPr>
+          <p:cNvCxnSpPr/>
+          <p:nvPr/>
+        </p:nvCxnSpPr>
+        <p:spPr>
+          <a:xfrm flipV="1">
+            <a:off x="8656082" y="2173146"/>
+            <a:ext cx="20632" cy="1436745"/>
+          </a:xfrm>
+          <a:prstGeom prst="bentConnector3">
+            <a:avLst>
+              <a:gd name="adj1" fmla="val 2369765"/>
+            </a:avLst>
+          </a:prstGeom>
+          <a:ln>
+            <a:tailEnd type="triangle"/>
+          </a:ln>
+        </p:spPr>
+        <p:style>
+          <a:lnRef idx="1">
+            <a:schemeClr val="accent4"/>
+          </a:lnRef>
+          <a:fillRef idx="0">
+            <a:schemeClr val="accent4"/>
+          </a:fillRef>
+          <a:effectRef idx="0">
+            <a:schemeClr val="accent4"/>
+          </a:effectRef>
+          <a:fontRef idx="minor">
+            <a:schemeClr val="tx1"/>
+          </a:fontRef>
+        </p:style>
+      </p:cxnSp>
+      <p:cxnSp>
+        <p:nvCxnSpPr>
+          <p:cNvPr id="144" name="Connector: Elbow 143">
+            <a:extLst>
+              <a:ext uri="{FF2B5EF4-FFF2-40B4-BE49-F238E27FC236}">
+                <a16:creationId xmlns:a16="http://schemas.microsoft.com/office/drawing/2014/main" id="{4C3FCF03-8C96-42CF-89AC-2765AC30599C}"/>
+              </a:ext>
+            </a:extLst>
+          </p:cNvPr>
+          <p:cNvCxnSpPr>
+            <a:stCxn id="7" idx="3"/>
+            <a:endCxn id="18" idx="3"/>
+          </p:cNvCxnSpPr>
+          <p:nvPr/>
+        </p:nvCxnSpPr>
+        <p:spPr>
+          <a:xfrm flipH="1" flipV="1">
+            <a:off x="7055274" y="4304502"/>
+            <a:ext cx="117076" cy="2303859"/>
+          </a:xfrm>
+          <a:prstGeom prst="bentConnector3">
+            <a:avLst>
+              <a:gd name="adj1" fmla="val -195258"/>
+            </a:avLst>
+          </a:prstGeom>
+          <a:ln>
+            <a:tailEnd type="triangle"/>
+          </a:ln>
+        </p:spPr>
+        <p:style>
+          <a:lnRef idx="1">
+            <a:schemeClr val="accent4"/>
+          </a:lnRef>
+          <a:fillRef idx="0">
+            <a:schemeClr val="accent4"/>
+          </a:fillRef>
+          <a:effectRef idx="0">
+            <a:schemeClr val="accent4"/>
+          </a:effectRef>
+          <a:fontRef idx="minor">
+            <a:schemeClr val="tx1"/>
+          </a:fontRef>
+        </p:style>
+      </p:cxnSp>
+      <p:cxnSp>
+        <p:nvCxnSpPr>
+          <p:cNvPr id="153" name="Connector: Elbow 152">
+            <a:extLst>
+              <a:ext uri="{FF2B5EF4-FFF2-40B4-BE49-F238E27FC236}">
+                <a16:creationId xmlns:a16="http://schemas.microsoft.com/office/drawing/2014/main" id="{5D3B41B3-FC5A-46F6-A4ED-C23643C0CB8E}"/>
+              </a:ext>
+            </a:extLst>
+          </p:cNvPr>
+          <p:cNvCxnSpPr>
+            <a:stCxn id="69" idx="3"/>
+            <a:endCxn id="70" idx="3"/>
+          </p:cNvCxnSpPr>
+          <p:nvPr/>
+        </p:nvCxnSpPr>
+        <p:spPr>
+          <a:xfrm flipV="1">
+            <a:off x="7216650" y="2904814"/>
+            <a:ext cx="12700" cy="2141822"/>
+          </a:xfrm>
+          <a:prstGeom prst="bentConnector3">
+            <a:avLst>
+              <a:gd name="adj1" fmla="val 2289323"/>
+            </a:avLst>
+          </a:prstGeom>
+          <a:ln>
+            <a:tailEnd type="triangle"/>
+          </a:ln>
+        </p:spPr>
+        <p:style>
+          <a:lnRef idx="1">
+            <a:schemeClr val="accent4"/>
+          </a:lnRef>
+          <a:fillRef idx="0">
+            <a:schemeClr val="accent4"/>
+          </a:fillRef>
+          <a:effectRef idx="0">
+            <a:schemeClr val="accent4"/>
+          </a:effectRef>
+          <a:fontRef idx="minor">
+            <a:schemeClr val="tx1"/>
+          </a:fontRef>
+        </p:style>
+      </p:cxnSp>
+      <p:cxnSp>
+        <p:nvCxnSpPr>
+          <p:cNvPr id="160" name="Connector: Elbow 159">
+            <a:extLst>
+              <a:ext uri="{FF2B5EF4-FFF2-40B4-BE49-F238E27FC236}">
+                <a16:creationId xmlns:a16="http://schemas.microsoft.com/office/drawing/2014/main" id="{BFF315F5-6170-49C2-A7AD-F27CFE22D535}"/>
+              </a:ext>
+            </a:extLst>
+          </p:cNvPr>
+          <p:cNvCxnSpPr>
+            <a:stCxn id="18" idx="3"/>
+            <a:endCxn id="115" idx="3"/>
+          </p:cNvCxnSpPr>
+          <p:nvPr/>
+        </p:nvCxnSpPr>
+        <p:spPr>
+          <a:xfrm flipV="1">
+            <a:off x="7055274" y="2138478"/>
+            <a:ext cx="138344" cy="2166024"/>
+          </a:xfrm>
+          <a:prstGeom prst="bentConnector3">
+            <a:avLst>
+              <a:gd name="adj1" fmla="val 432085"/>
+            </a:avLst>
+          </a:prstGeom>
+          <a:ln>
+            <a:tailEnd type="triangle"/>
+          </a:ln>
+        </p:spPr>
+        <p:style>
+          <a:lnRef idx="1">
+            <a:schemeClr val="accent4"/>
+          </a:lnRef>
+          <a:fillRef idx="0">
+            <a:schemeClr val="accent4"/>
+          </a:fillRef>
+          <a:effectRef idx="0">
+            <a:schemeClr val="accent4"/>
+          </a:effectRef>
+          <a:fontRef idx="minor">
+            <a:schemeClr val="tx1"/>
+          </a:fontRef>
+        </p:style>
+      </p:cxnSp>
+      <p:cxnSp>
+        <p:nvCxnSpPr>
+          <p:cNvPr id="167" name="Connector: Elbow 166">
+            <a:extLst>
+              <a:ext uri="{FF2B5EF4-FFF2-40B4-BE49-F238E27FC236}">
+                <a16:creationId xmlns:a16="http://schemas.microsoft.com/office/drawing/2014/main" id="{486DFFEE-F2C8-4E63-8D29-D7ED85DEDFC6}"/>
+              </a:ext>
+            </a:extLst>
+          </p:cNvPr>
+          <p:cNvCxnSpPr>
+            <a:stCxn id="17" idx="3"/>
+            <a:endCxn id="45" idx="3"/>
+          </p:cNvCxnSpPr>
+          <p:nvPr/>
+        </p:nvCxnSpPr>
+        <p:spPr>
+          <a:xfrm flipH="1" flipV="1">
+            <a:off x="7055274" y="1405538"/>
+            <a:ext cx="117076" cy="2205181"/>
+          </a:xfrm>
+          <a:prstGeom prst="bentConnector3">
+            <a:avLst>
+              <a:gd name="adj1" fmla="val -521319"/>
+            </a:avLst>
+          </a:prstGeom>
+          <a:ln>
+            <a:tailEnd type="triangle"/>
+          </a:ln>
+        </p:spPr>
+        <p:style>
+          <a:lnRef idx="1">
+            <a:schemeClr val="accent4"/>
+          </a:lnRef>
+          <a:fillRef idx="0">
+            <a:schemeClr val="accent4"/>
+          </a:fillRef>
+          <a:effectRef idx="0">
+            <a:schemeClr val="accent4"/>
+          </a:effectRef>
+          <a:fontRef idx="minor">
+            <a:schemeClr val="tx1"/>
+          </a:fontRef>
+        </p:style>
+      </p:cxnSp>
+      <p:cxnSp>
+        <p:nvCxnSpPr>
+          <p:cNvPr id="174" name="Connector: Elbow 173">
+            <a:extLst>
+              <a:ext uri="{FF2B5EF4-FFF2-40B4-BE49-F238E27FC236}">
+                <a16:creationId xmlns:a16="http://schemas.microsoft.com/office/drawing/2014/main" id="{CC576828-A9EF-403B-91CD-BE1CEAE6FBD0}"/>
+              </a:ext>
+            </a:extLst>
+          </p:cNvPr>
+          <p:cNvCxnSpPr>
+            <a:stCxn id="4" idx="3"/>
+            <a:endCxn id="16" idx="3"/>
+          </p:cNvCxnSpPr>
+          <p:nvPr/>
+        </p:nvCxnSpPr>
+        <p:spPr>
+          <a:xfrm flipV="1">
+            <a:off x="5735493" y="3609891"/>
+            <a:ext cx="12700" cy="2994639"/>
+          </a:xfrm>
+          <a:prstGeom prst="bentConnector3">
+            <a:avLst>
+              <a:gd name="adj1" fmla="val 1800000"/>
+            </a:avLst>
+          </a:prstGeom>
+          <a:ln>
+            <a:tailEnd type="triangle"/>
+          </a:ln>
+        </p:spPr>
+        <p:style>
+          <a:lnRef idx="1">
+            <a:schemeClr val="accent4"/>
+          </a:lnRef>
+          <a:fillRef idx="0">
+            <a:schemeClr val="accent4"/>
+          </a:fillRef>
+          <a:effectRef idx="0">
+            <a:schemeClr val="accent4"/>
+          </a:effectRef>
+          <a:fontRef idx="minor">
+            <a:schemeClr val="tx1"/>
+          </a:fontRef>
+        </p:style>
+      </p:cxnSp>
+      <p:cxnSp>
+        <p:nvCxnSpPr>
+          <p:cNvPr id="176" name="Connector: Elbow 175">
+            <a:extLst>
+              <a:ext uri="{FF2B5EF4-FFF2-40B4-BE49-F238E27FC236}">
+                <a16:creationId xmlns:a16="http://schemas.microsoft.com/office/drawing/2014/main" id="{27554757-B83C-4B5E-9450-4CF4418BA363}"/>
+              </a:ext>
+            </a:extLst>
+          </p:cNvPr>
+          <p:cNvCxnSpPr>
+            <a:stCxn id="72" idx="3"/>
+            <a:endCxn id="74" idx="3"/>
+          </p:cNvCxnSpPr>
+          <p:nvPr/>
+        </p:nvCxnSpPr>
+        <p:spPr>
+          <a:xfrm flipH="1" flipV="1">
+            <a:off x="5749420" y="2138478"/>
+            <a:ext cx="5236" cy="2908158"/>
+          </a:xfrm>
+          <a:prstGeom prst="bentConnector3">
+            <a:avLst>
+              <a:gd name="adj1" fmla="val -7078743"/>
+            </a:avLst>
+          </a:prstGeom>
+          <a:ln>
+            <a:tailEnd type="triangle"/>
+          </a:ln>
+        </p:spPr>
+        <p:style>
+          <a:lnRef idx="1">
+            <a:schemeClr val="accent4"/>
+          </a:lnRef>
+          <a:fillRef idx="0">
+            <a:schemeClr val="accent4"/>
+          </a:fillRef>
+          <a:effectRef idx="0">
+            <a:schemeClr val="accent4"/>
+          </a:effectRef>
+          <a:fontRef idx="minor">
+            <a:schemeClr val="tx1"/>
+          </a:fontRef>
+        </p:style>
+      </p:cxnSp>
+      <p:cxnSp>
+        <p:nvCxnSpPr>
+          <p:cNvPr id="179" name="Connector: Elbow 178">
+            <a:extLst>
+              <a:ext uri="{FF2B5EF4-FFF2-40B4-BE49-F238E27FC236}">
+                <a16:creationId xmlns:a16="http://schemas.microsoft.com/office/drawing/2014/main" id="{EFC73B1C-6447-473C-9368-C24992A996E7}"/>
+              </a:ext>
+            </a:extLst>
+          </p:cNvPr>
+          <p:cNvCxnSpPr>
+            <a:stCxn id="71" idx="3"/>
+            <a:endCxn id="76" idx="3"/>
+          </p:cNvCxnSpPr>
+          <p:nvPr/>
+        </p:nvCxnSpPr>
+        <p:spPr>
+          <a:xfrm flipV="1">
+            <a:off x="5735493" y="1401707"/>
+            <a:ext cx="19162" cy="2902795"/>
+          </a:xfrm>
+          <a:prstGeom prst="bentConnector3">
+            <a:avLst>
+              <a:gd name="adj1" fmla="val 2775535"/>
+            </a:avLst>
+          </a:prstGeom>
+          <a:ln>
+            <a:tailEnd type="triangle"/>
+          </a:ln>
+        </p:spPr>
+        <p:style>
+          <a:lnRef idx="1">
+            <a:schemeClr val="accent4"/>
+          </a:lnRef>
+          <a:fillRef idx="0">
+            <a:schemeClr val="accent4"/>
+          </a:fillRef>
+          <a:effectRef idx="0">
+            <a:schemeClr val="accent4"/>
+          </a:effectRef>
+          <a:fontRef idx="minor">
+            <a:schemeClr val="tx1"/>
+          </a:fontRef>
+        </p:style>
+      </p:cxnSp>
+      <p:sp>
+        <p:nvSpPr>
+          <p:cNvPr id="193" name="TextBox 192">
+            <a:extLst>
+              <a:ext uri="{FF2B5EF4-FFF2-40B4-BE49-F238E27FC236}">
+                <a16:creationId xmlns:a16="http://schemas.microsoft.com/office/drawing/2014/main" id="{8AB63C25-93BE-474B-9EA2-689FAFF6791B}"/>
+              </a:ext>
+            </a:extLst>
+          </p:cNvPr>
+          <p:cNvSpPr txBox="1"/>
+          <p:nvPr/>
+        </p:nvSpPr>
+        <p:spPr>
+          <a:xfrm>
+            <a:off x="3862620" y="5604104"/>
+            <a:ext cx="351883" cy="369332"/>
+          </a:xfrm>
+          <a:prstGeom prst="rect">
+            <a:avLst/>
+          </a:prstGeom>
+          <a:noFill/>
+        </p:spPr>
+        <p:txBody>
+          <a:bodyPr wrap="square" rtlCol="0">
+            <a:spAutoFit/>
+          </a:bodyPr>
+          <a:lstStyle/>
+          <a:p>
+            <a:r>
+              <a:rPr lang="en-SG" dirty="0"/>
+              <a:t>…</a:t>
+            </a:r>
+          </a:p>
+        </p:txBody>
+      </p:sp>
+    </p:spTree>
+    <p:extLst>
+      <p:ext uri="{BB962C8B-B14F-4D97-AF65-F5344CB8AC3E}">
+        <p14:creationId xmlns:p14="http://schemas.microsoft.com/office/powerpoint/2010/main" val="1563589780"/>
+      </p:ext>
+    </p:extLst>
+  </p:cSld>
+  <p:clrMapOvr>
+    <a:masterClrMapping/>
+  </p:clrMapOvr>
+</p:sld>
+</file>
+
 <file path=ppt/theme/theme1.xml><?xml version="1.0" encoding="utf-8"?>
 <a:theme xmlns:a="http://schemas.openxmlformats.org/drawingml/2006/main" name="Office Theme">
   <a:themeElements>

</xml_diff>

<commit_message>
minor comment and subproblem graph changes
</commit_message>
<xml_diff>
--- a/example_class_3/Subproblem graph.pptx
+++ b/example_class_3/Subproblem graph.pptx
@@ -683,7 +683,7 @@
           <a:p>
             <a:fld id="{3E1B4801-6BF7-4998-8405-2590A5E52B70}" type="datetimeFigureOut">
               <a:rPr lang="en-SG" smtClean="0"/>
-              <a:t>3/11/2021</a:t>
+              <a:t>5/11/2021</a:t>
             </a:fld>
             <a:endParaRPr lang="en-SG"/>
           </a:p>
@@ -883,7 +883,7 @@
           <a:p>
             <a:fld id="{3E1B4801-6BF7-4998-8405-2590A5E52B70}" type="datetimeFigureOut">
               <a:rPr lang="en-SG" smtClean="0"/>
-              <a:t>3/11/2021</a:t>
+              <a:t>5/11/2021</a:t>
             </a:fld>
             <a:endParaRPr lang="en-SG"/>
           </a:p>
@@ -1093,7 +1093,7 @@
           <a:p>
             <a:fld id="{3E1B4801-6BF7-4998-8405-2590A5E52B70}" type="datetimeFigureOut">
               <a:rPr lang="en-SG" smtClean="0"/>
-              <a:t>3/11/2021</a:t>
+              <a:t>5/11/2021</a:t>
             </a:fld>
             <a:endParaRPr lang="en-SG"/>
           </a:p>
@@ -1293,7 +1293,7 @@
           <a:p>
             <a:fld id="{3E1B4801-6BF7-4998-8405-2590A5E52B70}" type="datetimeFigureOut">
               <a:rPr lang="en-SG" smtClean="0"/>
-              <a:t>3/11/2021</a:t>
+              <a:t>5/11/2021</a:t>
             </a:fld>
             <a:endParaRPr lang="en-SG"/>
           </a:p>
@@ -1569,7 +1569,7 @@
           <a:p>
             <a:fld id="{3E1B4801-6BF7-4998-8405-2590A5E52B70}" type="datetimeFigureOut">
               <a:rPr lang="en-SG" smtClean="0"/>
-              <a:t>3/11/2021</a:t>
+              <a:t>5/11/2021</a:t>
             </a:fld>
             <a:endParaRPr lang="en-SG"/>
           </a:p>
@@ -1837,7 +1837,7 @@
           <a:p>
             <a:fld id="{3E1B4801-6BF7-4998-8405-2590A5E52B70}" type="datetimeFigureOut">
               <a:rPr lang="en-SG" smtClean="0"/>
-              <a:t>3/11/2021</a:t>
+              <a:t>5/11/2021</a:t>
             </a:fld>
             <a:endParaRPr lang="en-SG"/>
           </a:p>
@@ -2252,7 +2252,7 @@
           <a:p>
             <a:fld id="{3E1B4801-6BF7-4998-8405-2590A5E52B70}" type="datetimeFigureOut">
               <a:rPr lang="en-SG" smtClean="0"/>
-              <a:t>3/11/2021</a:t>
+              <a:t>5/11/2021</a:t>
             </a:fld>
             <a:endParaRPr lang="en-SG"/>
           </a:p>
@@ -2394,7 +2394,7 @@
           <a:p>
             <a:fld id="{3E1B4801-6BF7-4998-8405-2590A5E52B70}" type="datetimeFigureOut">
               <a:rPr lang="en-SG" smtClean="0"/>
-              <a:t>3/11/2021</a:t>
+              <a:t>5/11/2021</a:t>
             </a:fld>
             <a:endParaRPr lang="en-SG"/>
           </a:p>
@@ -2507,7 +2507,7 @@
           <a:p>
             <a:fld id="{3E1B4801-6BF7-4998-8405-2590A5E52B70}" type="datetimeFigureOut">
               <a:rPr lang="en-SG" smtClean="0"/>
-              <a:t>3/11/2021</a:t>
+              <a:t>5/11/2021</a:t>
             </a:fld>
             <a:endParaRPr lang="en-SG"/>
           </a:p>
@@ -2820,7 +2820,7 @@
           <a:p>
             <a:fld id="{3E1B4801-6BF7-4998-8405-2590A5E52B70}" type="datetimeFigureOut">
               <a:rPr lang="en-SG" smtClean="0"/>
-              <a:t>3/11/2021</a:t>
+              <a:t>5/11/2021</a:t>
             </a:fld>
             <a:endParaRPr lang="en-SG"/>
           </a:p>
@@ -3109,7 +3109,7 @@
           <a:p>
             <a:fld id="{3E1B4801-6BF7-4998-8405-2590A5E52B70}" type="datetimeFigureOut">
               <a:rPr lang="en-SG" smtClean="0"/>
-              <a:t>3/11/2021</a:t>
+              <a:t>5/11/2021</a:t>
             </a:fld>
             <a:endParaRPr lang="en-SG"/>
           </a:p>
@@ -3352,7 +3352,7 @@
           <a:p>
             <a:fld id="{3E1B4801-6BF7-4998-8405-2590A5E52B70}" type="datetimeFigureOut">
               <a:rPr lang="en-SG" smtClean="0"/>
-              <a:t>3/11/2021</a:t>
+              <a:t>5/11/2021</a:t>
             </a:fld>
             <a:endParaRPr lang="en-SG"/>
           </a:p>
@@ -8707,7 +8707,7 @@
         <p:spPr>
           <a:xfrm>
             <a:off x="6381775" y="6423695"/>
-            <a:ext cx="790575" cy="369332"/>
+            <a:ext cx="784113" cy="369332"/>
           </a:xfrm>
           <a:prstGeom prst="rect">
             <a:avLst/>
@@ -9191,7 +9191,7 @@
         <p:spPr>
           <a:xfrm>
             <a:off x="6414528" y="3426053"/>
-            <a:ext cx="757822" cy="369332"/>
+            <a:ext cx="737898" cy="369332"/>
           </a:xfrm>
           <a:prstGeom prst="rect">
             <a:avLst/>
@@ -9226,7 +9226,7 @@
         <p:spPr>
           <a:xfrm>
             <a:off x="6403043" y="4119836"/>
-            <a:ext cx="652231" cy="369332"/>
+            <a:ext cx="737898" cy="369332"/>
           </a:xfrm>
           <a:prstGeom prst="rect">
             <a:avLst/>
@@ -9296,7 +9296,7 @@
         <p:spPr>
           <a:xfrm>
             <a:off x="6403043" y="1220872"/>
-            <a:ext cx="652231" cy="369332"/>
+            <a:ext cx="749383" cy="369332"/>
           </a:xfrm>
           <a:prstGeom prst="rect">
             <a:avLst/>
@@ -9361,10 +9361,10 @@
       </p:sp>
       <p:sp>
         <p:nvSpPr>
-          <p:cNvPr id="107" name="TextBox 106">
-            <a:extLst>
-              <a:ext uri="{FF2B5EF4-FFF2-40B4-BE49-F238E27FC236}">
-                <a16:creationId xmlns:a16="http://schemas.microsoft.com/office/drawing/2014/main" id="{1EB61DB3-7AEE-430E-B825-D8838F179EA3}"/>
+          <p:cNvPr id="110" name="TextBox 109">
+            <a:extLst>
+              <a:ext uri="{FF2B5EF4-FFF2-40B4-BE49-F238E27FC236}">
+                <a16:creationId xmlns:a16="http://schemas.microsoft.com/office/drawing/2014/main" id="{F927B82C-64EB-438E-89D1-437AA62EB1E1}"/>
               </a:ext>
             </a:extLst>
           </p:cNvPr>
@@ -9373,7 +9373,7 @@
         </p:nvSpPr>
         <p:spPr>
           <a:xfrm>
-            <a:off x="3688432" y="1217041"/>
+            <a:off x="7852155" y="3425225"/>
             <a:ext cx="790575" cy="369332"/>
           </a:xfrm>
           <a:prstGeom prst="rect">
@@ -9388,45 +9388,6 @@
           <a:lstStyle/>
           <a:p>
             <a:r>
-              <a:rPr lang="en-SG" dirty="0">
-                <a:solidFill>
-                  <a:srgbClr val="FF0000"/>
-                </a:solidFill>
-              </a:rPr>
-              <a:t>(0,3)</a:t>
-            </a:r>
-          </a:p>
-        </p:txBody>
-      </p:sp>
-      <p:sp>
-        <p:nvSpPr>
-          <p:cNvPr id="110" name="TextBox 109">
-            <a:extLst>
-              <a:ext uri="{FF2B5EF4-FFF2-40B4-BE49-F238E27FC236}">
-                <a16:creationId xmlns:a16="http://schemas.microsoft.com/office/drawing/2014/main" id="{F927B82C-64EB-438E-89D1-437AA62EB1E1}"/>
-              </a:ext>
-            </a:extLst>
-          </p:cNvPr>
-          <p:cNvSpPr txBox="1"/>
-          <p:nvPr/>
-        </p:nvSpPr>
-        <p:spPr>
-          <a:xfrm>
-            <a:off x="7852155" y="3425225"/>
-            <a:ext cx="790575" cy="369332"/>
-          </a:xfrm>
-          <a:prstGeom prst="rect">
-            <a:avLst/>
-          </a:prstGeom>
-          <a:noFill/>
-        </p:spPr>
-        <p:txBody>
-          <a:bodyPr wrap="square" rtlCol="0">
-            <a:spAutoFit/>
-          </a:bodyPr>
-          <a:lstStyle/>
-          <a:p>
-            <a:r>
               <a:rPr lang="en-SG" dirty="0"/>
               <a:t>(6,0)</a:t>
             </a:r>
@@ -9448,7 +9409,7 @@
         <p:spPr>
           <a:xfrm>
             <a:off x="6414528" y="1953812"/>
-            <a:ext cx="779090" cy="369332"/>
+            <a:ext cx="749446" cy="369332"/>
           </a:xfrm>
           <a:prstGeom prst="rect">
             <a:avLst/>
@@ -9522,9 +9483,9 @@
           <p:nvPr/>
         </p:nvCxnSpPr>
         <p:spPr>
-          <a:xfrm>
-            <a:off x="103851" y="345751"/>
-            <a:ext cx="852257" cy="0"/>
+          <a:xfrm flipH="1" flipV="1">
+            <a:off x="9064983" y="475361"/>
+            <a:ext cx="852255" cy="6391"/>
           </a:xfrm>
           <a:prstGeom prst="straightConnector1">
             <a:avLst/>
@@ -9562,7 +9523,7 @@
         </p:nvSpPr>
         <p:spPr>
           <a:xfrm>
-            <a:off x="1233480" y="180216"/>
+            <a:off x="10179535" y="312411"/>
             <a:ext cx="2044878" cy="523220"/>
           </a:xfrm>
           <a:prstGeom prst="rect">
@@ -9578,7 +9539,7 @@
           <a:p>
             <a:r>
               <a:rPr lang="en-SG" sz="1400" dirty="0"/>
-              <a:t>Object picks itself and stays on the same object</a:t>
+              <a:t>Picks object and stays on the same object</a:t>
             </a:r>
           </a:p>
         </p:txBody>
@@ -9592,13 +9553,15 @@
               </a:ext>
             </a:extLst>
           </p:cNvPr>
-          <p:cNvCxnSpPr/>
+          <p:cNvCxnSpPr>
+            <a:cxnSpLocks/>
+          </p:cNvCxnSpPr>
           <p:nvPr/>
         </p:nvCxnSpPr>
         <p:spPr>
-          <a:xfrm>
-            <a:off x="103851" y="939210"/>
-            <a:ext cx="852257" cy="0"/>
+          <a:xfrm flipH="1">
+            <a:off x="9064984" y="1063152"/>
+            <a:ext cx="852255" cy="0"/>
           </a:xfrm>
           <a:prstGeom prst="straightConnector1">
             <a:avLst/>
@@ -9636,7 +9599,7 @@
         </p:nvSpPr>
         <p:spPr>
           <a:xfrm>
-            <a:off x="1233480" y="777069"/>
+            <a:off x="10179535" y="909264"/>
             <a:ext cx="2044878" cy="307777"/>
           </a:xfrm>
           <a:prstGeom prst="rect">
@@ -9823,8 +9786,8 @@
         </p:nvSpPr>
         <p:spPr>
           <a:xfrm>
-            <a:off x="6426075" y="4861970"/>
-            <a:ext cx="790575" cy="369332"/>
+            <a:off x="6426076" y="4861970"/>
+            <a:ext cx="739812" cy="369332"/>
           </a:xfrm>
           <a:prstGeom prst="rect">
             <a:avLst/>
@@ -9858,8 +9821,8 @@
         </p:nvSpPr>
         <p:spPr>
           <a:xfrm>
-            <a:off x="6426075" y="2720148"/>
-            <a:ext cx="790575" cy="369332"/>
+            <a:off x="6426076" y="2720148"/>
+            <a:ext cx="737898" cy="369332"/>
           </a:xfrm>
           <a:prstGeom prst="rect">
             <a:avLst/>
@@ -9928,8 +9891,8 @@
         </p:nvSpPr>
         <p:spPr>
           <a:xfrm>
-            <a:off x="4964081" y="4861970"/>
-            <a:ext cx="790575" cy="369332"/>
+            <a:off x="4969866" y="4861970"/>
+            <a:ext cx="784790" cy="369332"/>
           </a:xfrm>
           <a:prstGeom prst="rect">
             <a:avLst/>
@@ -10075,8 +10038,8 @@
         </p:nvCxnSpPr>
         <p:spPr>
           <a:xfrm flipH="1">
-            <a:off x="7193618" y="2138478"/>
-            <a:ext cx="658536" cy="0"/>
+            <a:off x="7163974" y="2138478"/>
+            <a:ext cx="688180" cy="0"/>
           </a:xfrm>
           <a:prstGeom prst="straightConnector1">
             <a:avLst/>
@@ -10118,8 +10081,8 @@
         </p:nvCxnSpPr>
         <p:spPr>
           <a:xfrm flipH="1">
-            <a:off x="7172350" y="3609891"/>
-            <a:ext cx="679805" cy="828"/>
+            <a:off x="7152426" y="3609891"/>
+            <a:ext cx="699729" cy="828"/>
           </a:xfrm>
           <a:prstGeom prst="straightConnector1">
             <a:avLst/>
@@ -10153,6 +10116,7 @@
             </a:extLst>
           </p:cNvPr>
           <p:cNvCxnSpPr>
+            <a:cxnSpLocks/>
             <a:stCxn id="20" idx="1"/>
             <a:endCxn id="69" idx="3"/>
           </p:cNvCxnSpPr>
@@ -10160,8 +10124,8 @@
         </p:nvCxnSpPr>
         <p:spPr>
           <a:xfrm flipH="1">
-            <a:off x="7216650" y="5046636"/>
-            <a:ext cx="614873" cy="0"/>
+            <a:off x="7165888" y="5046636"/>
+            <a:ext cx="665635" cy="0"/>
           </a:xfrm>
           <a:prstGeom prst="straightConnector1">
             <a:avLst/>
@@ -10195,6 +10159,7 @@
             </a:extLst>
           </p:cNvPr>
           <p:cNvCxnSpPr>
+            <a:cxnSpLocks/>
             <a:stCxn id="8" idx="1"/>
             <a:endCxn id="7" idx="3"/>
           </p:cNvCxnSpPr>
@@ -10202,8 +10167,8 @@
         </p:nvCxnSpPr>
         <p:spPr>
           <a:xfrm flipH="1">
-            <a:off x="7172350" y="6608361"/>
-            <a:ext cx="679806" cy="0"/>
+            <a:off x="7165888" y="6608361"/>
+            <a:ext cx="686268" cy="0"/>
           </a:xfrm>
           <a:prstGeom prst="straightConnector1">
             <a:avLst/>
@@ -10237,6 +10202,7 @@
             </a:extLst>
           </p:cNvPr>
           <p:cNvCxnSpPr>
+            <a:cxnSpLocks/>
             <a:stCxn id="7" idx="1"/>
             <a:endCxn id="4" idx="3"/>
           </p:cNvCxnSpPr>
@@ -10321,6 +10287,7 @@
             </a:extLst>
           </p:cNvPr>
           <p:cNvCxnSpPr>
+            <a:cxnSpLocks/>
             <a:stCxn id="69" idx="1"/>
             <a:endCxn id="72" idx="3"/>
           </p:cNvCxnSpPr>
@@ -10329,7 +10296,7 @@
         <p:spPr>
           <a:xfrm flipH="1">
             <a:off x="5754656" y="5046636"/>
-            <a:ext cx="671419" cy="0"/>
+            <a:ext cx="671420" cy="0"/>
           </a:xfrm>
           <a:prstGeom prst="straightConnector1">
             <a:avLst/>
@@ -10363,6 +10330,7 @@
             </a:extLst>
           </p:cNvPr>
           <p:cNvCxnSpPr>
+            <a:cxnSpLocks/>
             <a:stCxn id="72" idx="1"/>
             <a:endCxn id="135" idx="3"/>
           </p:cNvCxnSpPr>
@@ -10371,7 +10339,7 @@
         <p:spPr>
           <a:xfrm flipH="1">
             <a:off x="4476243" y="5046636"/>
-            <a:ext cx="487838" cy="0"/>
+            <a:ext cx="493623" cy="0"/>
           </a:xfrm>
           <a:prstGeom prst="straightConnector1">
             <a:avLst/>
@@ -10405,6 +10373,7 @@
             </a:extLst>
           </p:cNvPr>
           <p:cNvCxnSpPr>
+            <a:cxnSpLocks/>
             <a:stCxn id="18" idx="1"/>
             <a:endCxn id="71" idx="3"/>
           </p:cNvCxnSpPr>
@@ -10489,6 +10458,7 @@
             </a:extLst>
           </p:cNvPr>
           <p:cNvCxnSpPr>
+            <a:cxnSpLocks/>
             <a:stCxn id="17" idx="1"/>
             <a:endCxn id="16" idx="3"/>
           </p:cNvCxnSpPr>
@@ -10531,6 +10501,7 @@
             </a:extLst>
           </p:cNvPr>
           <p:cNvCxnSpPr>
+            <a:cxnSpLocks/>
             <a:stCxn id="70" idx="1"/>
             <a:endCxn id="73" idx="3"/>
           </p:cNvCxnSpPr>
@@ -10539,7 +10510,7 @@
         <p:spPr>
           <a:xfrm flipH="1">
             <a:off x="5754656" y="2904814"/>
-            <a:ext cx="671419" cy="3339"/>
+            <a:ext cx="671420" cy="3339"/>
           </a:xfrm>
           <a:prstGeom prst="straightConnector1">
             <a:avLst/>
@@ -10657,6 +10628,7 @@
             </a:extLst>
           </p:cNvPr>
           <p:cNvCxnSpPr>
+            <a:cxnSpLocks/>
             <a:stCxn id="115" idx="1"/>
             <a:endCxn id="74" idx="3"/>
           </p:cNvCxnSpPr>
@@ -10708,48 +10680,6 @@
           <a:xfrm flipH="1">
             <a:off x="4483446" y="2138478"/>
             <a:ext cx="475399" cy="2187"/>
-          </a:xfrm>
-          <a:prstGeom prst="straightConnector1">
-            <a:avLst/>
-          </a:prstGeom>
-          <a:ln>
-            <a:tailEnd type="triangle"/>
-          </a:ln>
-        </p:spPr>
-        <p:style>
-          <a:lnRef idx="1">
-            <a:schemeClr val="accent1"/>
-          </a:lnRef>
-          <a:fillRef idx="0">
-            <a:schemeClr val="accent1"/>
-          </a:fillRef>
-          <a:effectRef idx="0">
-            <a:schemeClr val="accent1"/>
-          </a:effectRef>
-          <a:fontRef idx="minor">
-            <a:schemeClr val="tx1"/>
-          </a:fontRef>
-        </p:style>
-      </p:cxnSp>
-      <p:cxnSp>
-        <p:nvCxnSpPr>
-          <p:cNvPr id="85" name="Straight Arrow Connector 84">
-            <a:extLst>
-              <a:ext uri="{FF2B5EF4-FFF2-40B4-BE49-F238E27FC236}">
-                <a16:creationId xmlns:a16="http://schemas.microsoft.com/office/drawing/2014/main" id="{85C9F6AF-1695-4653-9464-6725A0348202}"/>
-              </a:ext>
-            </a:extLst>
-          </p:cNvPr>
-          <p:cNvCxnSpPr>
-            <a:stCxn id="45" idx="1"/>
-            <a:endCxn id="76" idx="3"/>
-          </p:cNvCxnSpPr>
-          <p:nvPr/>
-        </p:nvCxnSpPr>
-        <p:spPr>
-          <a:xfrm flipH="1" flipV="1">
-            <a:off x="5754655" y="1401707"/>
-            <a:ext cx="648388" cy="3831"/>
           </a:xfrm>
           <a:prstGeom prst="straightConnector1">
             <a:avLst/>
@@ -10871,7 +10801,7 @@
           </a:xfrm>
           <a:prstGeom prst="bentConnector3">
             <a:avLst>
-              <a:gd name="adj1" fmla="val 1638275"/>
+              <a:gd name="adj1" fmla="val 1380104"/>
             </a:avLst>
           </a:prstGeom>
           <a:ln>
@@ -10912,7 +10842,7 @@
           </a:xfrm>
           <a:prstGeom prst="bentConnector3">
             <a:avLst>
-              <a:gd name="adj1" fmla="val 2369765"/>
+              <a:gd name="adj1" fmla="val 1896452"/>
             </a:avLst>
           </a:prstGeom>
           <a:ln>
@@ -10944,6 +10874,7 @@
             </a:extLst>
           </p:cNvPr>
           <p:cNvCxnSpPr>
+            <a:cxnSpLocks/>
             <a:stCxn id="7" idx="3"/>
             <a:endCxn id="18" idx="3"/>
           </p:cNvCxnSpPr>
@@ -10951,12 +10882,12 @@
         </p:nvCxnSpPr>
         <p:spPr>
           <a:xfrm flipH="1" flipV="1">
-            <a:off x="7055274" y="4304502"/>
-            <a:ext cx="117076" cy="2303859"/>
+            <a:off x="7140941" y="4304502"/>
+            <a:ext cx="24947" cy="2303859"/>
           </a:xfrm>
           <a:prstGeom prst="bentConnector3">
             <a:avLst>
-              <a:gd name="adj1" fmla="val -195258"/>
+              <a:gd name="adj1" fmla="val -916343"/>
             </a:avLst>
           </a:prstGeom>
           <a:ln>
@@ -10988,19 +10919,20 @@
             </a:extLst>
           </p:cNvPr>
           <p:cNvCxnSpPr>
+            <a:cxnSpLocks/>
             <a:stCxn id="69" idx="3"/>
             <a:endCxn id="70" idx="3"/>
           </p:cNvCxnSpPr>
           <p:nvPr/>
         </p:nvCxnSpPr>
         <p:spPr>
-          <a:xfrm flipV="1">
-            <a:off x="7216650" y="2904814"/>
-            <a:ext cx="12700" cy="2141822"/>
+          <a:xfrm flipH="1" flipV="1">
+            <a:off x="7163974" y="2904814"/>
+            <a:ext cx="1914" cy="2141822"/>
           </a:xfrm>
           <a:prstGeom prst="bentConnector3">
             <a:avLst>
-              <a:gd name="adj1" fmla="val 2289323"/>
+              <a:gd name="adj1" fmla="val -17973302"/>
             </a:avLst>
           </a:prstGeom>
           <a:ln>
@@ -11032,6 +10964,7 @@
             </a:extLst>
           </p:cNvPr>
           <p:cNvCxnSpPr>
+            <a:cxnSpLocks/>
             <a:stCxn id="18" idx="3"/>
             <a:endCxn id="115" idx="3"/>
           </p:cNvCxnSpPr>
@@ -11039,12 +10972,12 @@
         </p:nvCxnSpPr>
         <p:spPr>
           <a:xfrm flipV="1">
-            <a:off x="7055274" y="2138478"/>
-            <a:ext cx="138344" cy="2166024"/>
+            <a:off x="7140941" y="2138478"/>
+            <a:ext cx="23033" cy="2166024"/>
           </a:xfrm>
           <a:prstGeom prst="bentConnector3">
             <a:avLst>
-              <a:gd name="adj1" fmla="val 432085"/>
+              <a:gd name="adj1" fmla="val 2171697"/>
             </a:avLst>
           </a:prstGeom>
           <a:ln>
@@ -11076,19 +11009,20 @@
             </a:extLst>
           </p:cNvPr>
           <p:cNvCxnSpPr>
+            <a:cxnSpLocks/>
             <a:stCxn id="17" idx="3"/>
             <a:endCxn id="45" idx="3"/>
           </p:cNvCxnSpPr>
           <p:nvPr/>
         </p:nvCxnSpPr>
         <p:spPr>
-          <a:xfrm flipH="1" flipV="1">
-            <a:off x="7055274" y="1405538"/>
-            <a:ext cx="117076" cy="2205181"/>
+          <a:xfrm flipV="1">
+            <a:off x="7152426" y="1405538"/>
+            <a:ext cx="12700" cy="2205181"/>
           </a:xfrm>
           <a:prstGeom prst="bentConnector3">
             <a:avLst>
-              <a:gd name="adj1" fmla="val -521319"/>
+              <a:gd name="adj1" fmla="val 4805819"/>
             </a:avLst>
           </a:prstGeom>
           <a:ln>
@@ -11164,6 +11098,7 @@
             </a:extLst>
           </p:cNvPr>
           <p:cNvCxnSpPr>
+            <a:cxnSpLocks/>
             <a:stCxn id="72" idx="3"/>
             <a:endCxn id="74" idx="3"/>
           </p:cNvCxnSpPr>
@@ -11176,7 +11111,7 @@
           </a:xfrm>
           <a:prstGeom prst="bentConnector3">
             <a:avLst>
-              <a:gd name="adj1" fmla="val -7078743"/>
+              <a:gd name="adj1" fmla="val -6739649"/>
             </a:avLst>
           </a:prstGeom>
           <a:ln>

</xml_diff>